<commit_message>
Se agrega la última slide a la presentación
</commit_message>
<xml_diff>
--- a/01_INTRODUCTION/01_INTRODUCCION_TSLAB.pptx
+++ b/01_INTRODUCTION/01_INTRODUCCION_TSLAB.pptx
@@ -2594,7 +2594,7 @@
           <a:lstStyle/>
           <a:p>
             <a:pPr algn="ctr"/>
-            <a:endParaRPr lang="en-US"/>
+            <a:endParaRPr lang="en-US" dirty="0"/>
           </a:p>
         </p:txBody>
       </p:sp>
@@ -4510,10 +4510,9 @@
               <a:buAutoNum type="arabicPeriod"/>
             </a:pPr>
             <a:r>
-              <a:rPr lang="es-ES" dirty="0" err="1"/>
+              <a:rPr lang="es-ES" dirty="0"/>
               <a:t>Outliers</a:t>
             </a:r>
-            <a:endParaRPr lang="es-ES" dirty="0"/>
           </a:p>
           <a:p>
             <a:pPr marL="800100" lvl="1" indent="-342900">
@@ -5081,7 +5080,7 @@
           <a:lstStyle/>
           <a:p>
             <a:pPr algn="ctr"/>
-            <a:endParaRPr lang="en-US">
+            <a:endParaRPr lang="en-US" dirty="0">
               <a:solidFill>
                 <a:schemeClr val="tx1"/>
               </a:solidFill>
@@ -5969,7 +5968,7 @@
           <a:lstStyle/>
           <a:p>
             <a:pPr algn="ctr"/>
-            <a:endParaRPr lang="en-US">
+            <a:endParaRPr lang="en-US" dirty="0">
               <a:solidFill>
                 <a:schemeClr val="tx1"/>
               </a:solidFill>
@@ -6431,7 +6430,7 @@
           <a:lstStyle/>
           <a:p>
             <a:pPr algn="ctr"/>
-            <a:endParaRPr lang="en-US">
+            <a:endParaRPr lang="en-US" dirty="0">
               <a:solidFill>
                 <a:schemeClr val="tx1"/>
               </a:solidFill>
@@ -6777,7 +6776,7 @@
           <a:lstStyle/>
           <a:p>
             <a:pPr algn="ctr"/>
-            <a:endParaRPr lang="en-US">
+            <a:endParaRPr lang="en-US" dirty="0">
               <a:solidFill>
                 <a:schemeClr val="tx1"/>
               </a:solidFill>
@@ -7595,7 +7594,7 @@
           <a:lstStyle/>
           <a:p>
             <a:pPr algn="ctr"/>
-            <a:endParaRPr lang="en-US">
+            <a:endParaRPr lang="en-US" dirty="0">
               <a:solidFill>
                 <a:schemeClr val="tx1"/>
               </a:solidFill>
@@ -7873,7 +7872,7 @@
         <p:spPr>
           <a:xfrm>
             <a:off x="302003" y="2108239"/>
-            <a:ext cx="8062352" cy="2948179"/>
+            <a:ext cx="8062352" cy="3779176"/>
           </a:xfrm>
           <a:prstGeom prst="rect">
             <a:avLst/>
@@ -7918,15 +7917,7 @@
             </a:pPr>
             <a:r>
               <a:rPr lang="es-ES" dirty="0"/>
-              <a:t>Obtener el </a:t>
-            </a:r>
-            <a:r>
-              <a:rPr lang="es-ES" dirty="0" err="1"/>
-              <a:t>dataset</a:t>
-            </a:r>
-            <a:r>
-              <a:rPr lang="es-ES" dirty="0"/>
-              <a:t> Madrid_polution.csv y analizar las columnas</a:t>
+              <a:t>Obtener el dataset Madrid_polution.csv y analizar el contenido de cada una de las columnas</a:t>
             </a:r>
           </a:p>
           <a:p>
@@ -7952,7 +7943,20 @@
             </a:pPr>
             <a:r>
               <a:rPr lang="es-ES" dirty="0"/>
-              <a:t>Hacer la descomposición de la serie temporal en sus 3 partes. </a:t>
+              <a:t>Hacer la descomposición de la serie temporal en sus 3 partes.</a:t>
+            </a:r>
+          </a:p>
+          <a:p>
+            <a:pPr marL="342900" indent="-342900">
+              <a:lnSpc>
+                <a:spcPct val="150000"/>
+              </a:lnSpc>
+              <a:buFont typeface="+mj-lt"/>
+              <a:buAutoNum type="arabicPeriod"/>
+            </a:pPr>
+            <a:r>
+              <a:rPr lang="es-ES" dirty="0"/>
+              <a:t>Hacer push* para subir vuestro trabajo al repositorio. </a:t>
             </a:r>
             <a:endParaRPr lang="en-US" dirty="0"/>
           </a:p>
@@ -7972,8 +7976,8 @@
         </p:nvSpPr>
         <p:spPr>
           <a:xfrm>
-            <a:off x="9009246" y="2782669"/>
-            <a:ext cx="3036373" cy="646331"/>
+            <a:off x="8711663" y="2979770"/>
+            <a:ext cx="3036373" cy="584775"/>
           </a:xfrm>
           <a:prstGeom prst="rect">
             <a:avLst/>
@@ -7987,15 +7991,77 @@
           <a:lstStyle/>
           <a:p>
             <a:r>
-              <a:rPr lang="es-ES" sz="1800" i="1" dirty="0" err="1">
+              <a:rPr lang="es-ES" sz="1600" i="1" dirty="0">
                 <a:solidFill>
                   <a:schemeClr val="accent3">
                     <a:lumMod val="50000"/>
                   </a:schemeClr>
                 </a:solidFill>
               </a:rPr>
-              <a:t>hint</a:t>
-            </a:r>
+              <a:t>hint – </a:t>
+            </a:r>
+            <a:r>
+              <a:rPr lang="es-ES" sz="1600" i="1" dirty="0" err="1">
+                <a:solidFill>
+                  <a:schemeClr val="accent3">
+                    <a:lumMod val="50000"/>
+                  </a:schemeClr>
+                </a:solidFill>
+              </a:rPr>
+              <a:t>pandas_profiling</a:t>
+            </a:r>
+            <a:r>
+              <a:rPr lang="en-US" sz="1600" i="1" dirty="0">
+                <a:solidFill>
+                  <a:schemeClr val="accent3">
+                    <a:lumMod val="50000"/>
+                  </a:schemeClr>
+                </a:solidFill>
+              </a:rPr>
+              <a:t> en Python</a:t>
+            </a:r>
+            <a:r>
+              <a:rPr lang="es-ES" sz="1600" i="1" dirty="0">
+                <a:solidFill>
+                  <a:schemeClr val="accent3">
+                    <a:lumMod val="50000"/>
+                  </a:schemeClr>
+                </a:solidFill>
+              </a:rPr>
+              <a:t> y inspectdf en R</a:t>
+            </a:r>
+            <a:endParaRPr lang="en-US" sz="1600" dirty="0"/>
+          </a:p>
+        </p:txBody>
+      </p:sp>
+      <p:sp>
+        <p:nvSpPr>
+          <p:cNvPr id="8" name="CuadroTexto 7">
+            <a:extLst>
+              <a:ext uri="{FF2B5EF4-FFF2-40B4-BE49-F238E27FC236}">
+                <a16:creationId xmlns:a16="http://schemas.microsoft.com/office/drawing/2014/main" id="{5CA730E0-A8BC-472F-93BF-09F401B942C8}"/>
+              </a:ext>
+            </a:extLst>
+          </p:cNvPr>
+          <p:cNvSpPr txBox="1"/>
+          <p:nvPr/>
+        </p:nvSpPr>
+        <p:spPr>
+          <a:xfrm>
+            <a:off x="933650" y="6137023"/>
+            <a:ext cx="6949439" cy="369332"/>
+          </a:xfrm>
+          <a:prstGeom prst="rect">
+            <a:avLst/>
+          </a:prstGeom>
+          <a:noFill/>
+        </p:spPr>
+        <p:txBody>
+          <a:bodyPr wrap="square" rtlCol="0">
+            <a:spAutoFit/>
+          </a:bodyPr>
+          <a:lstStyle/>
+          <a:p>
             <a:r>
               <a:rPr lang="es-ES" sz="1800" i="1" dirty="0">
                 <a:solidFill>
@@ -8004,20 +8070,116 @@
                   </a:schemeClr>
                 </a:solidFill>
               </a:rPr>
-              <a:t> – </a:t>
-            </a:r>
-            <a:r>
-              <a:rPr lang="es-ES" sz="1800" i="1" dirty="0" err="1">
+              <a:t>*Me decís si tenéis dudas al respecto y lo hacemos juntos ;)</a:t>
+            </a:r>
+            <a:endParaRPr lang="en-US" dirty="0"/>
+          </a:p>
+        </p:txBody>
+      </p:sp>
+      <p:sp>
+        <p:nvSpPr>
+          <p:cNvPr id="9" name="CuadroTexto 8">
+            <a:extLst>
+              <a:ext uri="{FF2B5EF4-FFF2-40B4-BE49-F238E27FC236}">
+                <a16:creationId xmlns:a16="http://schemas.microsoft.com/office/drawing/2014/main" id="{D3C57387-613B-48C2-997A-2D51B1786657}"/>
+              </a:ext>
+            </a:extLst>
+          </p:cNvPr>
+          <p:cNvSpPr txBox="1"/>
+          <p:nvPr/>
+        </p:nvSpPr>
+        <p:spPr>
+          <a:xfrm>
+            <a:off x="8859412" y="4058532"/>
+            <a:ext cx="3407343" cy="1200329"/>
+          </a:xfrm>
+          <a:prstGeom prst="rect">
+            <a:avLst/>
+          </a:prstGeom>
+          <a:noFill/>
+        </p:spPr>
+        <p:txBody>
+          <a:bodyPr wrap="square" rtlCol="0">
+            <a:spAutoFit/>
+          </a:bodyPr>
+          <a:lstStyle/>
+          <a:p>
+            <a:r>
+              <a:rPr lang="es-ES" sz="1800" i="1" dirty="0">
                 <a:solidFill>
                   <a:schemeClr val="accent3">
                     <a:lumMod val="50000"/>
                   </a:schemeClr>
                 </a:solidFill>
               </a:rPr>
-              <a:t>pandas_profiling</a:t>
-            </a:r>
-            <a:r>
-              <a:rPr lang="en-US" sz="1800" i="1" dirty="0">
+              <a:t>Python: </a:t>
+            </a:r>
+            <a:r>
+              <a:rPr kumimoji="0" lang="en-US" altLang="en-US" sz="1800" b="0" i="0" u="none" strike="noStrike" cap="none" normalizeH="0" baseline="0" dirty="0">
+                <a:ln>
+                  <a:noFill/>
+                </a:ln>
+                <a:solidFill>
+                  <a:srgbClr val="CC7832"/>
+                </a:solidFill>
+                <a:effectLst/>
+                <a:latin typeface="Consolas" panose="020B0609020204030204" pitchFamily="49" charset="0"/>
+              </a:rPr>
+              <a:t>from </a:t>
+            </a:r>
+            <a:r>
+              <a:rPr kumimoji="0" lang="en-US" altLang="en-US" sz="1800" b="0" i="0" u="none" strike="noStrike" cap="none" normalizeH="0" baseline="0" dirty="0">
+                <a:ln>
+                  <a:noFill/>
+                </a:ln>
+                <a:solidFill>
+                  <a:srgbClr val="A9B7C6"/>
+                </a:solidFill>
+                <a:effectLst/>
+                <a:latin typeface="Consolas" panose="020B0609020204030204" pitchFamily="49" charset="0"/>
+              </a:rPr>
+              <a:t>statsmodels.tsa.seasonal </a:t>
+            </a:r>
+            <a:r>
+              <a:rPr kumimoji="0" lang="en-US" altLang="en-US" sz="1800" b="0" i="0" u="none" strike="noStrike" cap="none" normalizeH="0" baseline="0" dirty="0">
+                <a:ln>
+                  <a:noFill/>
+                </a:ln>
+                <a:solidFill>
+                  <a:srgbClr val="CC7832"/>
+                </a:solidFill>
+                <a:effectLst/>
+                <a:latin typeface="Consolas" panose="020B0609020204030204" pitchFamily="49" charset="0"/>
+              </a:rPr>
+              <a:t>import </a:t>
+            </a:r>
+            <a:r>
+              <a:rPr kumimoji="0" lang="en-US" altLang="en-US" sz="1800" b="0" i="0" u="none" strike="noStrike" cap="none" normalizeH="0" baseline="0" dirty="0">
+                <a:ln>
+                  <a:noFill/>
+                </a:ln>
+                <a:solidFill>
+                  <a:srgbClr val="A9B7C6"/>
+                </a:solidFill>
+                <a:effectLst/>
+                <a:latin typeface="Consolas" panose="020B0609020204030204" pitchFamily="49" charset="0"/>
+              </a:rPr>
+              <a:t>seasonal_decompose</a:t>
+            </a:r>
+            <a:endParaRPr kumimoji="0" lang="en-US" altLang="en-US" sz="4400" b="0" i="0" u="none" strike="noStrike" cap="none" normalizeH="0" baseline="0" dirty="0">
+              <a:ln>
+                <a:noFill/>
+              </a:ln>
+              <a:solidFill>
+                <a:schemeClr val="tx1"/>
+              </a:solidFill>
+              <a:effectLst/>
+              <a:latin typeface="Arial" panose="020B0604020202020204" pitchFamily="34" charset="0"/>
+            </a:endParaRPr>
+          </a:p>
+          <a:p>
+            <a:r>
+              <a:rPr lang="es-ES" sz="1800" i="1" dirty="0">
                 <a:solidFill>
                   <a:schemeClr val="accent3">
                     <a:lumMod val="50000"/>
@@ -8026,26 +8188,38 @@
               </a:rPr>
               <a:t> </a:t>
             </a:r>
-            <a:r>
-              <a:rPr lang="en-US" sz="1800" i="1" dirty="0" err="1">
-                <a:solidFill>
-                  <a:schemeClr val="accent3">
-                    <a:lumMod val="50000"/>
-                  </a:schemeClr>
-                </a:solidFill>
-              </a:rPr>
-              <a:t>en</a:t>
-            </a:r>
-            <a:r>
-              <a:rPr lang="en-US" sz="1800" i="1" dirty="0">
-                <a:solidFill>
-                  <a:schemeClr val="accent3">
-                    <a:lumMod val="50000"/>
-                  </a:schemeClr>
-                </a:solidFill>
-              </a:rPr>
-              <a:t> Python</a:t>
-            </a:r>
+            <a:endParaRPr lang="en-US" dirty="0"/>
+          </a:p>
+        </p:txBody>
+      </p:sp>
+      <p:sp>
+        <p:nvSpPr>
+          <p:cNvPr id="13" name="CuadroTexto 12">
+            <a:extLst>
+              <a:ext uri="{FF2B5EF4-FFF2-40B4-BE49-F238E27FC236}">
+                <a16:creationId xmlns:a16="http://schemas.microsoft.com/office/drawing/2014/main" id="{645025CD-8587-40B2-94E2-7F2C4C92CA76}"/>
+              </a:ext>
+            </a:extLst>
+          </p:cNvPr>
+          <p:cNvSpPr txBox="1"/>
+          <p:nvPr/>
+        </p:nvSpPr>
+        <p:spPr>
+          <a:xfrm>
+            <a:off x="8859412" y="5230806"/>
+            <a:ext cx="3036373" cy="646331"/>
+          </a:xfrm>
+          <a:prstGeom prst="rect">
+            <a:avLst/>
+          </a:prstGeom>
+          <a:noFill/>
+        </p:spPr>
+        <p:txBody>
+          <a:bodyPr wrap="square" rtlCol="0">
+            <a:spAutoFit/>
+          </a:bodyPr>
+          <a:lstStyle/>
+          <a:p>
             <a:r>
               <a:rPr lang="es-ES" sz="1800" i="1" dirty="0">
                 <a:solidFill>
@@ -8054,17 +8228,15 @@
                   </a:schemeClr>
                 </a:solidFill>
               </a:rPr>
-              <a:t> y </a:t>
-            </a:r>
-            <a:r>
-              <a:rPr lang="es-ES" sz="1800" i="1" dirty="0" err="1">
+              <a:t>R: </a:t>
+            </a:r>
+            <a:r>
+              <a:rPr lang="es-ES" sz="1800" i="1" dirty="0">
                 <a:solidFill>
-                  <a:schemeClr val="accent3">
-                    <a:lumMod val="50000"/>
-                  </a:schemeClr>
+                  <a:srgbClr val="CC7832"/>
                 </a:solidFill>
               </a:rPr>
-              <a:t>inspectdf</a:t>
+              <a:t>library</a:t>
             </a:r>
             <a:r>
               <a:rPr lang="es-ES" sz="1800" i="1" dirty="0">
@@ -8074,7 +8246,23 @@
                   </a:schemeClr>
                 </a:solidFill>
               </a:rPr>
-              <a:t> en R</a:t>
+              <a:t>(forecast)</a:t>
+            </a:r>
+          </a:p>
+          <a:p>
+            <a:r>
+              <a:rPr lang="en-US" dirty="0"/>
+              <a:t>decompose</a:t>
+            </a:r>
+            <a:r>
+              <a:rPr lang="es-ES" i="1" dirty="0">
+                <a:solidFill>
+                  <a:schemeClr val="accent3">
+                    <a:lumMod val="50000"/>
+                  </a:schemeClr>
+                </a:solidFill>
+              </a:rPr>
+              <a:t>()</a:t>
             </a:r>
             <a:endParaRPr lang="en-US" dirty="0"/>
           </a:p>
@@ -8082,10 +8270,10 @@
       </p:sp>
       <p:sp>
         <p:nvSpPr>
-          <p:cNvPr id="5" name="Flecha: cheurón 4">
-            <a:extLst>
-              <a:ext uri="{FF2B5EF4-FFF2-40B4-BE49-F238E27FC236}">
-                <a16:creationId xmlns:a16="http://schemas.microsoft.com/office/drawing/2014/main" id="{E7CDDA19-8D97-44EA-A5FE-7232340DFBF4}"/>
+          <p:cNvPr id="11" name="Flecha: doblada 10">
+            <a:extLst>
+              <a:ext uri="{FF2B5EF4-FFF2-40B4-BE49-F238E27FC236}">
+                <a16:creationId xmlns:a16="http://schemas.microsoft.com/office/drawing/2014/main" id="{0F27B208-7074-4FF8-9617-8FECB0203917}"/>
               </a:ext>
             </a:extLst>
           </p:cNvPr>
@@ -8093,13 +8281,26 @@
           <p:nvPr/>
         </p:nvSpPr>
         <p:spPr>
-          <a:xfrm>
-            <a:off x="8590548" y="2916455"/>
-            <a:ext cx="192505" cy="375385"/>
-          </a:xfrm>
-          <a:prstGeom prst="chevron">
-            <a:avLst/>
-          </a:prstGeom>
+          <a:xfrm rot="18142551" flipV="1">
+            <a:off x="8267299" y="3491817"/>
+            <a:ext cx="363777" cy="390927"/>
+          </a:xfrm>
+          <a:prstGeom prst="bentArrow">
+            <a:avLst>
+              <a:gd name="adj1" fmla="val 25000"/>
+              <a:gd name="adj2" fmla="val 25000"/>
+              <a:gd name="adj3" fmla="val 25000"/>
+              <a:gd name="adj4" fmla="val 75000"/>
+            </a:avLst>
+          </a:prstGeom>
+          <a:solidFill>
+            <a:schemeClr val="tx1"/>
+          </a:solidFill>
+          <a:ln>
+            <a:solidFill>
+              <a:srgbClr val="001C54"/>
+            </a:solidFill>
+          </a:ln>
         </p:spPr>
         <p:style>
           <a:lnRef idx="2">
@@ -8122,11 +8323,128 @@
           <a:lstStyle/>
           <a:p>
             <a:pPr algn="ctr"/>
-            <a:endParaRPr lang="en-US">
+            <a:endParaRPr lang="en-US" dirty="0">
               <a:solidFill>
                 <a:schemeClr val="tx1"/>
               </a:solidFill>
             </a:endParaRPr>
+          </a:p>
+        </p:txBody>
+      </p:sp>
+      <p:sp>
+        <p:nvSpPr>
+          <p:cNvPr id="16" name="Flecha: doblada 15">
+            <a:extLst>
+              <a:ext uri="{FF2B5EF4-FFF2-40B4-BE49-F238E27FC236}">
+                <a16:creationId xmlns:a16="http://schemas.microsoft.com/office/drawing/2014/main" id="{BF7E68A0-4F4E-4698-95F3-436B3890C912}"/>
+              </a:ext>
+            </a:extLst>
+          </p:cNvPr>
+          <p:cNvSpPr/>
+          <p:nvPr/>
+        </p:nvSpPr>
+        <p:spPr>
+          <a:xfrm rot="18142551" flipV="1">
+            <a:off x="8173262" y="4347915"/>
+            <a:ext cx="551853" cy="621565"/>
+          </a:xfrm>
+          <a:prstGeom prst="bentArrow">
+            <a:avLst>
+              <a:gd name="adj1" fmla="val 25000"/>
+              <a:gd name="adj2" fmla="val 25000"/>
+              <a:gd name="adj3" fmla="val 25000"/>
+              <a:gd name="adj4" fmla="val 75000"/>
+            </a:avLst>
+          </a:prstGeom>
+          <a:solidFill>
+            <a:schemeClr val="tx1"/>
+          </a:solidFill>
+          <a:ln>
+            <a:solidFill>
+              <a:srgbClr val="001C54"/>
+            </a:solidFill>
+          </a:ln>
+        </p:spPr>
+        <p:style>
+          <a:lnRef idx="2">
+            <a:schemeClr val="accent1">
+              <a:shade val="50000"/>
+            </a:schemeClr>
+          </a:lnRef>
+          <a:fillRef idx="1">
+            <a:schemeClr val="accent1"/>
+          </a:fillRef>
+          <a:effectRef idx="0">
+            <a:schemeClr val="accent1"/>
+          </a:effectRef>
+          <a:fontRef idx="minor">
+            <a:schemeClr val="lt1"/>
+          </a:fontRef>
+        </p:style>
+        <p:txBody>
+          <a:bodyPr rtlCol="0" anchor="ctr"/>
+          <a:lstStyle/>
+          <a:p>
+            <a:pPr algn="ctr"/>
+            <a:endParaRPr lang="en-US" dirty="0">
+              <a:solidFill>
+                <a:schemeClr val="tx1"/>
+              </a:solidFill>
+            </a:endParaRPr>
+          </a:p>
+        </p:txBody>
+      </p:sp>
+      <p:sp>
+        <p:nvSpPr>
+          <p:cNvPr id="12" name="Flecha: a la derecha 11">
+            <a:extLst>
+              <a:ext uri="{FF2B5EF4-FFF2-40B4-BE49-F238E27FC236}">
+                <a16:creationId xmlns:a16="http://schemas.microsoft.com/office/drawing/2014/main" id="{ED6B3157-2252-4436-B4C3-642D28F357F5}"/>
+              </a:ext>
+            </a:extLst>
+          </p:cNvPr>
+          <p:cNvSpPr/>
+          <p:nvPr/>
+        </p:nvSpPr>
+        <p:spPr>
+          <a:xfrm rot="2432043">
+            <a:off x="7973741" y="4905537"/>
+            <a:ext cx="1066477" cy="249608"/>
+          </a:xfrm>
+          <a:prstGeom prst="rightArrow">
+            <a:avLst/>
+          </a:prstGeom>
+          <a:solidFill>
+            <a:schemeClr val="tx1"/>
+          </a:solidFill>
+          <a:ln>
+            <a:solidFill>
+              <a:srgbClr val="001C54"/>
+            </a:solidFill>
+          </a:ln>
+        </p:spPr>
+        <p:style>
+          <a:lnRef idx="2">
+            <a:schemeClr val="accent1">
+              <a:shade val="50000"/>
+            </a:schemeClr>
+          </a:lnRef>
+          <a:fillRef idx="1">
+            <a:schemeClr val="accent1"/>
+          </a:fillRef>
+          <a:effectRef idx="0">
+            <a:schemeClr val="accent1"/>
+          </a:effectRef>
+          <a:fontRef idx="minor">
+            <a:schemeClr val="lt1"/>
+          </a:fontRef>
+        </p:style>
+        <p:txBody>
+          <a:bodyPr rtlCol="0" anchor="ctr"/>
+          <a:lstStyle/>
+          <a:p>
+            <a:pPr algn="ctr"/>
+            <a:endParaRPr lang="en-US"/>
           </a:p>
         </p:txBody>
       </p:sp>
@@ -8551,11 +8869,27 @@
             </a:r>
             <a:r>
               <a:rPr lang="en-US" sz="1600" b="1" dirty="0"/>
-              <a:t>conocimiento práctico de análisis y modelado de series</a:t>
+              <a:t>conocimiento práctico de análisis y </a:t>
+            </a:r>
+            <a:r>
+              <a:rPr lang="en-US" sz="1600" b="1" dirty="0" err="1"/>
+              <a:t>modelado</a:t>
+            </a:r>
+            <a:r>
+              <a:rPr lang="en-US" sz="1600" b="1" dirty="0"/>
+              <a:t> de series</a:t>
             </a:r>
             <a:r>
               <a:rPr lang="en-US" sz="1600" dirty="0"/>
-              <a:t> temporales con datos de proyectos reales</a:t>
+              <a:t> </a:t>
+            </a:r>
+            <a:r>
+              <a:rPr lang="en-US" sz="1600" dirty="0" err="1"/>
+              <a:t>temporales</a:t>
+            </a:r>
+            <a:r>
+              <a:rPr lang="en-US" sz="1600" dirty="0"/>
+              <a:t> con datos de proyectos reales</a:t>
             </a:r>
           </a:p>
           <a:p>
@@ -8656,12 +8990,8 @@
               <a:buChar char="Ø"/>
             </a:pPr>
             <a:r>
-              <a:rPr lang="en-US" sz="1400" dirty="0" err="1"/>
-              <a:t>Statsmodels</a:t>
-            </a:r>
-            <a:r>
               <a:rPr lang="en-US" sz="1400" dirty="0"/>
-              <a:t> </a:t>
+              <a:t>Statsmodels </a:t>
             </a:r>
           </a:p>
           <a:p>
@@ -8681,13 +9011,8 @@
             </a:pPr>
             <a:r>
               <a:rPr lang="en-US" sz="1400" dirty="0"/>
-              <a:t>Plotly y Matplotlib para </a:t>
-            </a:r>
-            <a:r>
-              <a:rPr lang="en-US" sz="1400" dirty="0" err="1"/>
-              <a:t>Visualización</a:t>
-            </a:r>
-            <a:endParaRPr lang="en-US" sz="1400" dirty="0"/>
+              <a:t>Plotly y Matplotlib para Visualización</a:t>
+            </a:r>
           </a:p>
           <a:p>
             <a:pPr marL="1200150" lvl="2" indent="-285750">
@@ -8695,18 +9020,9 @@
               <a:buChar char="Ø"/>
             </a:pPr>
             <a:r>
-              <a:rPr lang="en-US" sz="1400" dirty="0" err="1"/>
-              <a:t>Tensorflow</a:t>
-            </a:r>
-            <a:r>
               <a:rPr lang="en-US" sz="1400" dirty="0"/>
-              <a:t> </a:t>
-            </a:r>
-            <a:r>
-              <a:rPr lang="en-US" sz="1400" dirty="0" err="1"/>
-              <a:t>Keras</a:t>
-            </a:r>
-            <a:endParaRPr lang="en-US" sz="1400" dirty="0"/>
+              <a:t>Tensorflow Keras</a:t>
+            </a:r>
           </a:p>
           <a:p>
             <a:pPr marL="742950" lvl="1" indent="-285750">
@@ -8724,10 +9040,9 @@
               <a:buChar char="Ø"/>
             </a:pPr>
             <a:r>
-              <a:rPr lang="en-US" sz="1400" dirty="0" err="1"/>
+              <a:rPr lang="en-US" sz="1400" dirty="0"/>
               <a:t>Dplyr</a:t>
             </a:r>
-            <a:endParaRPr lang="en-US" sz="1400" dirty="0"/>
           </a:p>
           <a:p>
             <a:pPr marL="1200150" lvl="2" indent="-285750">
@@ -9001,7 +9316,15 @@
             </a:pPr>
             <a:r>
               <a:rPr lang="en-US" sz="1400" dirty="0"/>
-              <a:t>Tests (ACF &amp; PACF, ADF, etc…)</a:t>
+              <a:t>Tests (ACF &amp; PACF, ADF, </a:t>
+            </a:r>
+            <a:r>
+              <a:rPr lang="en-US" sz="1400" dirty="0" err="1"/>
+              <a:t>etc</a:t>
+            </a:r>
+            <a:r>
+              <a:rPr lang="en-US" sz="1400" dirty="0"/>
+              <a:t>…)</a:t>
             </a:r>
           </a:p>
           <a:p>
@@ -9267,26 +9590,9 @@
               <a:buChar char="Ø"/>
             </a:pPr>
             <a:r>
-              <a:rPr lang="en-US" sz="1400" dirty="0" err="1"/>
-              <a:t>Modelado</a:t>
-            </a:r>
-            <a:r>
               <a:rPr lang="en-US" sz="1400" dirty="0"/>
-              <a:t> de Series </a:t>
-            </a:r>
-            <a:r>
-              <a:rPr lang="en-US" sz="1400" dirty="0" err="1"/>
-              <a:t>Temporales</a:t>
-            </a:r>
-            <a:r>
-              <a:rPr lang="en-US" sz="1400" dirty="0"/>
-              <a:t> con Redes </a:t>
-            </a:r>
-            <a:r>
-              <a:rPr lang="en-US" sz="1400" dirty="0" err="1"/>
-              <a:t>Neuronales</a:t>
-            </a:r>
-            <a:endParaRPr lang="en-US" sz="1400" dirty="0"/>
+              <a:t>Modelado de Series Temporales con Redes Neuronales</a:t>
+            </a:r>
           </a:p>
           <a:p>
             <a:pPr marL="1200150" lvl="2" indent="-285750">
@@ -9314,18 +9620,9 @@
               <a:buChar char="Ø"/>
             </a:pPr>
             <a:r>
-              <a:rPr lang="en-US" sz="1400" dirty="0" err="1"/>
-              <a:t>Aplicabilidad</a:t>
-            </a:r>
-            <a:r>
               <a:rPr lang="en-US" sz="1400" dirty="0"/>
-              <a:t> de </a:t>
-            </a:r>
-            <a:r>
-              <a:rPr lang="en-US" sz="1400" dirty="0" err="1"/>
-              <a:t>modelos</a:t>
-            </a:r>
-            <a:endParaRPr lang="en-US" sz="1400" dirty="0"/>
+              <a:t>Aplicabilidad de modelos</a:t>
+            </a:r>
           </a:p>
           <a:p>
             <a:pPr marL="1200150" lvl="2" indent="-285750">
@@ -9333,18 +9630,9 @@
               <a:buChar char="Ø"/>
             </a:pPr>
             <a:r>
-              <a:rPr lang="en-US" sz="1400" dirty="0" err="1"/>
-              <a:t>Teoría</a:t>
-            </a:r>
-            <a:r>
               <a:rPr lang="en-US" sz="1400" dirty="0"/>
-              <a:t> de los mercados </a:t>
-            </a:r>
-            <a:r>
-              <a:rPr lang="en-US" sz="1400" dirty="0" err="1"/>
-              <a:t>eficientes</a:t>
-            </a:r>
-            <a:endParaRPr lang="en-US" sz="1400" dirty="0"/>
+              <a:t>Teoría de los mercados eficientes</a:t>
+            </a:r>
           </a:p>
           <a:p>
             <a:pPr marL="742950" lvl="1" indent="-285750">
@@ -9352,10 +9640,9 @@
               <a:buChar char="Ø"/>
             </a:pPr>
             <a:r>
-              <a:rPr lang="en-US" sz="1400" dirty="0" err="1"/>
+              <a:rPr lang="en-US" sz="1400" dirty="0"/>
               <a:t>Simuladores</a:t>
             </a:r>
-            <a:endParaRPr lang="en-US" sz="1400" dirty="0"/>
           </a:p>
           <a:p>
             <a:pPr marL="1200150" lvl="2" indent="-285750">
@@ -9363,20 +9650,8 @@
               <a:buChar char="Ø"/>
             </a:pPr>
             <a:r>
-              <a:rPr lang="en-US" sz="1400" dirty="0" err="1"/>
-              <a:t>Importancia</a:t>
-            </a:r>
-            <a:r>
               <a:rPr lang="en-US" sz="1400" dirty="0"/>
-              <a:t> </a:t>
-            </a:r>
-            <a:r>
-              <a:rPr lang="en-US" sz="1400" dirty="0" err="1"/>
-              <a:t>relativa</a:t>
-            </a:r>
-            <a:r>
-              <a:rPr lang="en-US" sz="1400" dirty="0"/>
-              <a:t> de variables</a:t>
+              <a:t>Importancia relativa de variables</a:t>
             </a:r>
           </a:p>
           <a:p>
@@ -9385,20 +9660,8 @@
               <a:buChar char="Ø"/>
             </a:pPr>
             <a:r>
-              <a:rPr lang="en-US" sz="1400" dirty="0" err="1"/>
-              <a:t>Identificación</a:t>
-            </a:r>
-            <a:r>
               <a:rPr lang="en-US" sz="1400" dirty="0"/>
-              <a:t> de </a:t>
-            </a:r>
-            <a:r>
-              <a:rPr lang="en-US" sz="1400" dirty="0" err="1"/>
-              <a:t>varianza</a:t>
-            </a:r>
-            <a:r>
-              <a:rPr lang="en-US" sz="1400" dirty="0"/>
-              <a:t> base vs variable</a:t>
+              <a:t>Identificación de varianza base vs variable</a:t>
             </a:r>
           </a:p>
         </p:txBody>
@@ -9684,7 +9947,7 @@
           <a:lstStyle/>
           <a:p>
             <a:pPr algn="ctr"/>
-            <a:endParaRPr lang="en-US"/>
+            <a:endParaRPr lang="en-US" dirty="0"/>
           </a:p>
         </p:txBody>
       </p:sp>
@@ -9762,61 +10025,8 @@
             </a:pPr>
             <a:r>
               <a:rPr lang="en-US" sz="1400" dirty="0"/>
-              <a:t>Self Paced – </a:t>
-            </a:r>
-            <a:r>
-              <a:rPr lang="en-US" sz="1400" dirty="0" err="1"/>
-              <a:t>Cada</a:t>
-            </a:r>
-            <a:r>
-              <a:rPr lang="en-US" sz="1400" dirty="0"/>
-              <a:t> uno a </a:t>
-            </a:r>
-            <a:r>
-              <a:rPr lang="en-US" sz="1400" dirty="0" err="1"/>
-              <a:t>su</a:t>
-            </a:r>
-            <a:r>
-              <a:rPr lang="en-US" sz="1400" dirty="0"/>
-              <a:t> </a:t>
-            </a:r>
-            <a:r>
-              <a:rPr lang="en-US" sz="1400" dirty="0" err="1"/>
-              <a:t>ritmo</a:t>
-            </a:r>
-            <a:r>
-              <a:rPr lang="en-US" sz="1400" dirty="0"/>
-              <a:t> y al </a:t>
-            </a:r>
-            <a:r>
-              <a:rPr lang="en-US" sz="1400" dirty="0" err="1"/>
-              <a:t>nivel</a:t>
-            </a:r>
-            <a:r>
-              <a:rPr lang="en-US" sz="1400" dirty="0"/>
-              <a:t> de </a:t>
-            </a:r>
-            <a:r>
-              <a:rPr lang="en-US" sz="1400" dirty="0" err="1"/>
-              <a:t>profundidad</a:t>
-            </a:r>
-            <a:r>
-              <a:rPr lang="en-US" sz="1400" dirty="0"/>
-              <a:t> que </a:t>
-            </a:r>
-            <a:r>
-              <a:rPr lang="en-US" sz="1400" dirty="0" err="1"/>
-              <a:t>quiera</a:t>
-            </a:r>
-            <a:r>
-              <a:rPr lang="en-US" sz="1400" dirty="0"/>
-              <a:t> </a:t>
-            </a:r>
-            <a:r>
-              <a:rPr lang="en-US" sz="1400" dirty="0" err="1"/>
-              <a:t>llegar</a:t>
-            </a:r>
-            <a:endParaRPr lang="en-US" sz="1400" dirty="0"/>
+              <a:t>Self Paced – Cada uno a su ritmo y al nivel de profundidad que quiera llegar</a:t>
+            </a:r>
           </a:p>
           <a:p>
             <a:pPr marL="742950" lvl="1" indent="-285750">
@@ -10407,12 +10617,8 @@
           <a:p>
             <a:pPr algn="ctr"/>
             <a:r>
-              <a:rPr lang="es-ES" sz="3200" dirty="0" err="1"/>
-              <a:t>Outline</a:t>
-            </a:r>
-            <a:r>
               <a:rPr lang="es-ES" sz="3200" dirty="0"/>
-              <a:t> Sesión Nº1</a:t>
+              <a:t>Outline Sesión Nº1</a:t>
             </a:r>
             <a:endParaRPr lang="en-US" sz="2800" dirty="0"/>
           </a:p>
@@ -10457,18 +10663,9 @@
               <a:buChar char="Ø"/>
             </a:pPr>
             <a:r>
-              <a:rPr lang="en-US" sz="1400" dirty="0" err="1"/>
-              <a:t>Motivación</a:t>
-            </a:r>
-            <a:r>
               <a:rPr lang="en-US" sz="1400" dirty="0"/>
-              <a:t> del </a:t>
-            </a:r>
-            <a:r>
-              <a:rPr lang="en-US" sz="1400" dirty="0" err="1"/>
-              <a:t>caso</a:t>
-            </a:r>
-            <a:endParaRPr lang="en-US" sz="1400" dirty="0"/>
+              <a:t>Motivación del caso</a:t>
+            </a:r>
           </a:p>
           <a:p>
             <a:pPr marL="742950" lvl="1" indent="-285750">
@@ -10476,18 +10673,9 @@
               <a:buChar char="Ø"/>
             </a:pPr>
             <a:r>
-              <a:rPr lang="en-US" sz="1400" dirty="0" err="1"/>
-              <a:t>Objetivos</a:t>
-            </a:r>
-            <a:r>
               <a:rPr lang="en-US" sz="1400" dirty="0"/>
-              <a:t> del </a:t>
-            </a:r>
-            <a:r>
-              <a:rPr lang="en-US" sz="1400" dirty="0" err="1"/>
-              <a:t>caso</a:t>
-            </a:r>
-            <a:endParaRPr lang="en-US" sz="1400" dirty="0"/>
+              <a:t>Objetivos del caso</a:t>
+            </a:r>
           </a:p>
           <a:p>
             <a:pPr marL="742950" lvl="1" indent="-285750">
@@ -10495,10 +10683,9 @@
               <a:buChar char="Ø"/>
             </a:pPr>
             <a:r>
-              <a:rPr lang="en-US" sz="1400" dirty="0" err="1"/>
+              <a:rPr lang="en-US" sz="1400" dirty="0"/>
               <a:t>Desafíos</a:t>
             </a:r>
-            <a:endParaRPr lang="en-US" sz="1400" dirty="0"/>
           </a:p>
           <a:p>
             <a:pPr lvl="1"/>
@@ -10546,23 +10733,7 @@
             </a:pPr>
             <a:r>
               <a:rPr lang="en-US" sz="1400" dirty="0"/>
-              <a:t>¿</a:t>
-            </a:r>
-            <a:r>
-              <a:rPr lang="en-US" sz="1400" dirty="0" err="1"/>
-              <a:t>Qué</a:t>
-            </a:r>
-            <a:r>
-              <a:rPr lang="en-US" sz="1400" dirty="0"/>
-              <a:t> es una </a:t>
-            </a:r>
-            <a:r>
-              <a:rPr lang="en-US" sz="1400" dirty="0" err="1"/>
-              <a:t>serie</a:t>
-            </a:r>
-            <a:r>
-              <a:rPr lang="en-US" sz="1400" dirty="0"/>
-              <a:t> temporal?</a:t>
+              <a:t>¿Qué es una serie temporal?</a:t>
             </a:r>
           </a:p>
           <a:p>
@@ -10571,18 +10742,9 @@
               <a:buChar char="Ø"/>
             </a:pPr>
             <a:r>
-              <a:rPr lang="en-US" sz="1400" dirty="0" err="1"/>
-              <a:t>Elección</a:t>
-            </a:r>
-            <a:r>
               <a:rPr lang="en-US" sz="1400" dirty="0"/>
-              <a:t> de </a:t>
-            </a:r>
-            <a:r>
-              <a:rPr lang="en-US" sz="1400" dirty="0" err="1"/>
-              <a:t>Resolución</a:t>
-            </a:r>
-            <a:endParaRPr lang="en-US" sz="1400" dirty="0"/>
+              <a:t>Elección de Resolución</a:t>
+            </a:r>
           </a:p>
           <a:p>
             <a:pPr marL="742950" lvl="1" indent="-285750">
@@ -10590,12 +10752,8 @@
               <a:buChar char="Ø"/>
             </a:pPr>
             <a:r>
-              <a:rPr lang="en-US" sz="1400" dirty="0" err="1"/>
-              <a:t>Descomposición</a:t>
-            </a:r>
-            <a:r>
               <a:rPr lang="en-US" sz="1400" dirty="0"/>
-              <a:t> de las series</a:t>
+              <a:t>Descomposición de las series</a:t>
             </a:r>
           </a:p>
           <a:p>
@@ -10867,15 +11025,7 @@
           <a:p>
             <a:r>
               <a:rPr lang="es-ES" dirty="0"/>
-              <a:t>Hemos sido contratados por la Asociación </a:t>
-            </a:r>
-            <a:r>
-              <a:rPr lang="es-ES" dirty="0" err="1"/>
-              <a:t>Tinámistica</a:t>
-            </a:r>
-            <a:r>
-              <a:rPr lang="es-ES" dirty="0"/>
-              <a:t> del Deporte de Madrid para ayudarles a dar recomendaciones anticipadas a los ciudadanos de Madrid sobre cuándo se debería promover hacer deporte y cuándo es recomendable parar de hacer deporte. </a:t>
+              <a:t>Hemos sido contratados por la Asociación Tinámistica del Deporte de Madrid para ayudarles a dar recomendaciones anticipadas a los ciudadanos de Madrid sobre cuándo se debería promover hacer deporte y cuándo es recomendable parar de hacer deporte. </a:t>
             </a:r>
             <a:endParaRPr lang="en-US" dirty="0"/>
           </a:p>
@@ -10974,7 +11124,7 @@
           <a:lstStyle/>
           <a:p>
             <a:pPr algn="ctr"/>
-            <a:endParaRPr lang="en-US">
+            <a:endParaRPr lang="en-US" dirty="0">
               <a:solidFill>
                 <a:schemeClr val="tx1"/>
               </a:solidFill>
@@ -11030,7 +11180,7 @@
           <a:lstStyle/>
           <a:p>
             <a:pPr algn="ctr"/>
-            <a:endParaRPr lang="en-US">
+            <a:endParaRPr lang="en-US" dirty="0">
               <a:solidFill>
                 <a:schemeClr val="tx1"/>
               </a:solidFill>
@@ -11365,7 +11515,7 @@
           <a:lstStyle/>
           <a:p>
             <a:pPr algn="ctr"/>
-            <a:endParaRPr lang="en-US"/>
+            <a:endParaRPr lang="en-US" dirty="0"/>
           </a:p>
         </p:txBody>
       </p:sp>
@@ -11408,18 +11558,9 @@
               <a:buChar char="Ø"/>
             </a:pPr>
             <a:r>
-              <a:rPr lang="en-US" sz="1400" dirty="0" err="1"/>
-              <a:t>Tráfico</a:t>
-            </a:r>
-            <a:r>
               <a:rPr lang="en-US" sz="1400" dirty="0"/>
-              <a:t> </a:t>
-            </a:r>
-            <a:r>
-              <a:rPr lang="en-US" sz="1400" dirty="0" err="1"/>
-              <a:t>Urbano</a:t>
-            </a:r>
-            <a:endParaRPr lang="en-US" sz="1400" dirty="0"/>
+              <a:t>Tráfico Urbano</a:t>
+            </a:r>
           </a:p>
           <a:p>
             <a:pPr marL="742950" lvl="1" indent="-285750">
@@ -11427,18 +11568,9 @@
               <a:buChar char="Ø"/>
             </a:pPr>
             <a:r>
-              <a:rPr lang="en-US" sz="1400" dirty="0" err="1"/>
-              <a:t>Sistemas</a:t>
-            </a:r>
-            <a:r>
               <a:rPr lang="en-US" sz="1400" dirty="0"/>
-              <a:t> de </a:t>
-            </a:r>
-            <a:r>
-              <a:rPr lang="en-US" sz="1400" dirty="0" err="1"/>
-              <a:t>Calefacción</a:t>
-            </a:r>
-            <a:endParaRPr lang="en-US" sz="1400" dirty="0"/>
+              <a:t>Sistemas de Calefacción</a:t>
+            </a:r>
           </a:p>
           <a:p>
             <a:pPr marL="742950" lvl="1" indent="-285750">
@@ -11446,12 +11578,8 @@
               <a:buChar char="Ø"/>
             </a:pPr>
             <a:r>
-              <a:rPr lang="en-US" sz="1400" dirty="0" err="1"/>
-              <a:t>Actividad</a:t>
-            </a:r>
-            <a:r>
               <a:rPr lang="en-US" sz="1400" dirty="0"/>
-              <a:t> Industrial</a:t>
+              <a:t>Actividad Industrial</a:t>
             </a:r>
           </a:p>
           <a:p>
@@ -11460,10 +11588,9 @@
               <a:buChar char="Ø"/>
             </a:pPr>
             <a:r>
-              <a:rPr lang="en-US" sz="1400" dirty="0" err="1"/>
+              <a:rPr lang="en-US" sz="1400" dirty="0"/>
               <a:t>Incendios</a:t>
             </a:r>
-            <a:endParaRPr lang="en-US" sz="1400" dirty="0"/>
           </a:p>
           <a:p>
             <a:pPr marL="742950" lvl="1" indent="-285750">
@@ -11471,12 +11598,8 @@
               <a:buChar char="Ø"/>
             </a:pPr>
             <a:r>
-              <a:rPr lang="en-US" sz="1400" dirty="0" err="1"/>
-              <a:t>Etc</a:t>
-            </a:r>
-            <a:r>
               <a:rPr lang="en-US" sz="1400" dirty="0"/>
-              <a:t>… </a:t>
+              <a:t>Etc… </a:t>
             </a:r>
           </a:p>
         </p:txBody>
@@ -11520,10 +11643,9 @@
               <a:buChar char="Ø"/>
             </a:pPr>
             <a:r>
-              <a:rPr lang="en-US" sz="1400" dirty="0" err="1"/>
+              <a:rPr lang="en-US" sz="1400" dirty="0"/>
               <a:t>Lluvias</a:t>
             </a:r>
-            <a:endParaRPr lang="en-US" sz="1400" dirty="0"/>
           </a:p>
           <a:p>
             <a:pPr marL="742950" lvl="1" indent="-285750">
@@ -11531,10 +11653,9 @@
               <a:buChar char="Ø"/>
             </a:pPr>
             <a:r>
-              <a:rPr lang="en-US" sz="1400" dirty="0" err="1"/>
+              <a:rPr lang="en-US" sz="1400" dirty="0"/>
               <a:t>Viento</a:t>
             </a:r>
-            <a:endParaRPr lang="en-US" sz="1400" dirty="0"/>
           </a:p>
           <a:p>
             <a:pPr marL="742950" lvl="1" indent="-285750">
@@ -11542,10 +11663,9 @@
               <a:buChar char="Ø"/>
             </a:pPr>
             <a:r>
-              <a:rPr lang="en-US" sz="1400" dirty="0" err="1"/>
+              <a:rPr lang="en-US" sz="1400" dirty="0"/>
               <a:t>Temperatura</a:t>
             </a:r>
-            <a:endParaRPr lang="en-US" sz="1400" dirty="0"/>
           </a:p>
           <a:p>
             <a:pPr marL="742950" lvl="1" indent="-285750">
@@ -11553,20 +11673,8 @@
               <a:buChar char="Ø"/>
             </a:pPr>
             <a:r>
-              <a:rPr lang="en-US" sz="1400" dirty="0" err="1"/>
-              <a:t>Factores</a:t>
-            </a:r>
-            <a:r>
               <a:rPr lang="en-US" sz="1400" dirty="0"/>
-              <a:t> </a:t>
-            </a:r>
-            <a:r>
-              <a:rPr lang="en-US" sz="1400" dirty="0" err="1"/>
-              <a:t>sociales</a:t>
-            </a:r>
-            <a:r>
-              <a:rPr lang="en-US" sz="1400" dirty="0"/>
-              <a:t> </a:t>
+              <a:t>Factores sociales </a:t>
             </a:r>
           </a:p>
         </p:txBody>

</xml_diff>

<commit_message>
Changed 01_presentation to include better examples
</commit_message>
<xml_diff>
--- a/01_INTRODUCTION/01_INTRODUCCION_TSLAB.pptx
+++ b/01_INTRODUCTION/01_INTRODUCCION_TSLAB.pptx
@@ -5,7 +5,7 @@
     <p:sldMasterId id="2147483648" r:id="rId1"/>
   </p:sldMasterIdLst>
   <p:notesMasterIdLst>
-    <p:notesMasterId r:id="rId20"/>
+    <p:notesMasterId r:id="rId22"/>
   </p:notesMasterIdLst>
   <p:sldIdLst>
     <p:sldId id="256" r:id="rId2"/>
@@ -20,12 +20,14 @@
     <p:sldId id="553" r:id="rId11"/>
     <p:sldId id="556" r:id="rId12"/>
     <p:sldId id="559" r:id="rId13"/>
-    <p:sldId id="561" r:id="rId14"/>
-    <p:sldId id="560" r:id="rId15"/>
-    <p:sldId id="558" r:id="rId16"/>
-    <p:sldId id="562" r:id="rId17"/>
-    <p:sldId id="563" r:id="rId18"/>
-    <p:sldId id="538" r:id="rId19"/>
+    <p:sldId id="564" r:id="rId14"/>
+    <p:sldId id="561" r:id="rId15"/>
+    <p:sldId id="560" r:id="rId16"/>
+    <p:sldId id="565" r:id="rId17"/>
+    <p:sldId id="558" r:id="rId18"/>
+    <p:sldId id="562" r:id="rId19"/>
+    <p:sldId id="563" r:id="rId20"/>
+    <p:sldId id="538" r:id="rId21"/>
   </p:sldIdLst>
   <p:sldSz cx="12192000" cy="6858000"/>
   <p:notesSz cx="6858000" cy="9144000"/>
@@ -141,8 +143,10 @@
             <p14:sldId id="553"/>
             <p14:sldId id="556"/>
             <p14:sldId id="559"/>
+            <p14:sldId id="564"/>
             <p14:sldId id="561"/>
             <p14:sldId id="560"/>
+            <p14:sldId id="565"/>
             <p14:sldId id="558"/>
             <p14:sldId id="562"/>
             <p14:sldId id="563"/>
@@ -243,7 +247,7 @@
           <a:p>
             <a:fld id="{6118F894-A91F-4842-BD9A-7582ADBE2C27}" type="datetimeFigureOut">
               <a:rPr lang="en-US" smtClean="0"/>
-              <a:t>3/11/2021</a:t>
+              <a:t>3/17/2021</a:t>
             </a:fld>
             <a:endParaRPr lang="en-US" dirty="0"/>
           </a:p>
@@ -660,7 +664,7 @@
           <a:p>
             <a:fld id="{15119D3F-0F06-48B5-A311-F7380CC22BDC}" type="datetimeFigureOut">
               <a:rPr lang="en-US" smtClean="0"/>
-              <a:t>3/11/2021</a:t>
+              <a:t>3/17/2021</a:t>
             </a:fld>
             <a:endParaRPr lang="en-US" dirty="0"/>
           </a:p>
@@ -860,7 +864,7 @@
           <a:p>
             <a:fld id="{15119D3F-0F06-48B5-A311-F7380CC22BDC}" type="datetimeFigureOut">
               <a:rPr lang="en-US" smtClean="0"/>
-              <a:t>3/11/2021</a:t>
+              <a:t>3/17/2021</a:t>
             </a:fld>
             <a:endParaRPr lang="en-US" dirty="0"/>
           </a:p>
@@ -1070,7 +1074,7 @@
           <a:p>
             <a:fld id="{15119D3F-0F06-48B5-A311-F7380CC22BDC}" type="datetimeFigureOut">
               <a:rPr lang="en-US" smtClean="0"/>
-              <a:t>3/11/2021</a:t>
+              <a:t>3/17/2021</a:t>
             </a:fld>
             <a:endParaRPr lang="en-US" dirty="0"/>
           </a:p>
@@ -1270,7 +1274,7 @@
           <a:p>
             <a:fld id="{15119D3F-0F06-48B5-A311-F7380CC22BDC}" type="datetimeFigureOut">
               <a:rPr lang="en-US" smtClean="0"/>
-              <a:t>3/11/2021</a:t>
+              <a:t>3/17/2021</a:t>
             </a:fld>
             <a:endParaRPr lang="en-US" dirty="0"/>
           </a:p>
@@ -1546,7 +1550,7 @@
           <a:p>
             <a:fld id="{15119D3F-0F06-48B5-A311-F7380CC22BDC}" type="datetimeFigureOut">
               <a:rPr lang="en-US" smtClean="0"/>
-              <a:t>3/11/2021</a:t>
+              <a:t>3/17/2021</a:t>
             </a:fld>
             <a:endParaRPr lang="en-US" dirty="0"/>
           </a:p>
@@ -1814,7 +1818,7 @@
           <a:p>
             <a:fld id="{15119D3F-0F06-48B5-A311-F7380CC22BDC}" type="datetimeFigureOut">
               <a:rPr lang="en-US" smtClean="0"/>
-              <a:t>3/11/2021</a:t>
+              <a:t>3/17/2021</a:t>
             </a:fld>
             <a:endParaRPr lang="en-US" dirty="0"/>
           </a:p>
@@ -2229,7 +2233,7 @@
           <a:p>
             <a:fld id="{15119D3F-0F06-48B5-A311-F7380CC22BDC}" type="datetimeFigureOut">
               <a:rPr lang="en-US" smtClean="0"/>
-              <a:t>3/11/2021</a:t>
+              <a:t>3/17/2021</a:t>
             </a:fld>
             <a:endParaRPr lang="en-US" dirty="0"/>
           </a:p>
@@ -2371,7 +2375,7 @@
           <a:p>
             <a:fld id="{15119D3F-0F06-48B5-A311-F7380CC22BDC}" type="datetimeFigureOut">
               <a:rPr lang="en-US" smtClean="0"/>
-              <a:t>3/11/2021</a:t>
+              <a:t>3/17/2021</a:t>
             </a:fld>
             <a:endParaRPr lang="en-US" dirty="0"/>
           </a:p>
@@ -2484,7 +2488,7 @@
           <a:p>
             <a:fld id="{15119D3F-0F06-48B5-A311-F7380CC22BDC}" type="datetimeFigureOut">
               <a:rPr lang="en-US" smtClean="0"/>
-              <a:t>3/11/2021</a:t>
+              <a:t>3/17/2021</a:t>
             </a:fld>
             <a:endParaRPr lang="en-US" dirty="0"/>
           </a:p>
@@ -2898,7 +2902,7 @@
           <a:p>
             <a:fld id="{15119D3F-0F06-48B5-A311-F7380CC22BDC}" type="datetimeFigureOut">
               <a:rPr lang="en-US" smtClean="0"/>
-              <a:t>3/11/2021</a:t>
+              <a:t>3/17/2021</a:t>
             </a:fld>
             <a:endParaRPr lang="en-US" dirty="0"/>
           </a:p>
@@ -3187,7 +3191,7 @@
           <a:p>
             <a:fld id="{15119D3F-0F06-48B5-A311-F7380CC22BDC}" type="datetimeFigureOut">
               <a:rPr lang="en-US" smtClean="0"/>
-              <a:t>3/11/2021</a:t>
+              <a:t>3/17/2021</a:t>
             </a:fld>
             <a:endParaRPr lang="en-US" dirty="0"/>
           </a:p>
@@ -3432,7 +3436,7 @@
             <a:fld id="{15119D3F-0F06-48B5-A311-F7380CC22BDC}" type="datetimeFigureOut">
               <a:rPr lang="en-US" smtClean="0"/>
               <a:pPr/>
-              <a:t>3/11/2021</a:t>
+              <a:t>3/17/2021</a:t>
             </a:fld>
             <a:endParaRPr lang="en-US" dirty="0"/>
           </a:p>
@@ -4475,7 +4479,7 @@
         <p:spPr>
           <a:xfrm>
             <a:off x="302002" y="2108239"/>
-            <a:ext cx="11685865" cy="2585323"/>
+            <a:ext cx="11685865" cy="2862322"/>
           </a:xfrm>
           <a:prstGeom prst="rect">
             <a:avLst/>
@@ -4556,7 +4560,7 @@
             </a:pPr>
             <a:r>
               <a:rPr lang="es-ES" dirty="0"/>
-              <a:t>Entender y simular los efectos que tienen las variables sobre la variable dependiente</a:t>
+              <a:t>Entender y simular los efectos que tienen las variables independientes sobre la variable dependiente</a:t>
             </a:r>
           </a:p>
           <a:p>
@@ -5088,8 +5092,8 @@
           </a:p>
         </p:txBody>
       </p:sp>
-      <mc:AlternateContent xmlns:mc="http://schemas.openxmlformats.org/markup-compatibility/2006">
-        <mc:Choice xmlns:a14="http://schemas.microsoft.com/office/drawing/2010/main" Requires="a14">
+      <mc:AlternateContent xmlns:mc="http://schemas.openxmlformats.org/markup-compatibility/2006" xmlns:a14="http://schemas.microsoft.com/office/drawing/2010/main">
+        <mc:Choice Requires="a14">
           <p:sp>
             <p:nvSpPr>
               <p:cNvPr id="32" name="CuadroTexto 31">
@@ -5118,6 +5122,7 @@
               </a:bodyPr>
               <a:lstStyle/>
               <a:p>
+                <a:pPr/>
                 <a14:m>
                   <m:oMathPara xmlns:m="http://schemas.openxmlformats.org/officeDocument/2006/math">
                     <m:oMathParaPr>
@@ -5212,7 +5217,7 @@
             </p:txBody>
           </p:sp>
         </mc:Choice>
-        <mc:Fallback>
+        <mc:Fallback xmlns="">
           <p:sp>
             <p:nvSpPr>
               <p:cNvPr id="32" name="CuadroTexto 31">
@@ -6186,96 +6191,12 @@
           </a:p>
         </p:txBody>
       </p:sp>
-      <p:sp>
-        <p:nvSpPr>
-          <p:cNvPr id="18" name="CuadroTexto 17">
-            <a:extLst>
-              <a:ext uri="{FF2B5EF4-FFF2-40B4-BE49-F238E27FC236}">
-                <a16:creationId xmlns:a16="http://schemas.microsoft.com/office/drawing/2014/main" id="{9898DF31-EB59-43BC-9039-CB0673664ECD}"/>
-              </a:ext>
-            </a:extLst>
-          </p:cNvPr>
-          <p:cNvSpPr txBox="1"/>
-          <p:nvPr/>
-        </p:nvSpPr>
-        <p:spPr>
-          <a:xfrm>
-            <a:off x="1132113" y="6447509"/>
-            <a:ext cx="5287347" cy="261610"/>
-          </a:xfrm>
-          <a:prstGeom prst="rect">
-            <a:avLst/>
-          </a:prstGeom>
-          <a:noFill/>
-        </p:spPr>
-        <p:txBody>
-          <a:bodyPr wrap="square" rtlCol="0">
-            <a:spAutoFit/>
-          </a:bodyPr>
-          <a:lstStyle/>
-          <a:p>
-            <a:r>
-              <a:rPr lang="es-ES" sz="1100" dirty="0">
-                <a:solidFill>
-                  <a:schemeClr val="accent2">
-                    <a:lumMod val="50000"/>
-                  </a:schemeClr>
-                </a:solidFill>
-              </a:rPr>
-              <a:t>Población Norteamericana de Linces desde 1820 a 1920 </a:t>
-            </a:r>
-            <a:endParaRPr lang="en-US" sz="1100" dirty="0">
-              <a:solidFill>
-                <a:schemeClr val="accent2">
-                  <a:lumMod val="50000"/>
-                </a:schemeClr>
-              </a:solidFill>
-            </a:endParaRPr>
-          </a:p>
-        </p:txBody>
-      </p:sp>
-      <p:sp>
-        <p:nvSpPr>
-          <p:cNvPr id="6" name="CuadroTexto 5">
-            <a:extLst>
-              <a:ext uri="{FF2B5EF4-FFF2-40B4-BE49-F238E27FC236}">
-                <a16:creationId xmlns:a16="http://schemas.microsoft.com/office/drawing/2014/main" id="{D7ABC953-147A-4E8C-A639-6222905C7826}"/>
-              </a:ext>
-            </a:extLst>
-          </p:cNvPr>
-          <p:cNvSpPr txBox="1"/>
-          <p:nvPr/>
-        </p:nvSpPr>
-        <p:spPr>
-          <a:xfrm>
-            <a:off x="7081935" y="3420089"/>
-            <a:ext cx="4842588" cy="923330"/>
-          </a:xfrm>
-          <a:prstGeom prst="rect">
-            <a:avLst/>
-          </a:prstGeom>
-          <a:noFill/>
-        </p:spPr>
-        <p:txBody>
-          <a:bodyPr wrap="square" rtlCol="0">
-            <a:spAutoFit/>
-          </a:bodyPr>
-          <a:lstStyle/>
-          <a:p>
-            <a:r>
-              <a:rPr lang="es-ES" dirty="0"/>
-              <a:t>Entendiendo el pasado de la serie y siendo capaces de ajustarlo podemos tener una predicción del futuro</a:t>
-            </a:r>
-            <a:endParaRPr lang="en-US" dirty="0"/>
-          </a:p>
-        </p:txBody>
-      </p:sp>
       <p:pic>
         <p:nvPicPr>
-          <p:cNvPr id="4" name="Imagen 3">
-            <a:extLst>
-              <a:ext uri="{FF2B5EF4-FFF2-40B4-BE49-F238E27FC236}">
-                <a16:creationId xmlns:a16="http://schemas.microsoft.com/office/drawing/2014/main" id="{BE87692F-26F5-46A8-804C-51ABC84F9175}"/>
+          <p:cNvPr id="3" name="Imagen 2">
+            <a:extLst>
+              <a:ext uri="{FF2B5EF4-FFF2-40B4-BE49-F238E27FC236}">
+                <a16:creationId xmlns:a16="http://schemas.microsoft.com/office/drawing/2014/main" id="{3E2C3CAE-0F9A-45C0-8FAF-B5B33D6A0BC2}"/>
               </a:ext>
             </a:extLst>
           </p:cNvPr>
@@ -6292,8 +6213,8 @@
         </p:blipFill>
         <p:spPr>
           <a:xfrm>
-            <a:off x="387010" y="1996040"/>
-            <a:ext cx="5708990" cy="4451469"/>
+            <a:off x="403879" y="1760767"/>
+            <a:ext cx="6015581" cy="4686742"/>
           </a:xfrm>
           <a:prstGeom prst="rect">
             <a:avLst/>
@@ -6302,10 +6223,10 @@
       </p:pic>
       <p:sp>
         <p:nvSpPr>
-          <p:cNvPr id="5" name="CuadroTexto 4">
-            <a:extLst>
-              <a:ext uri="{FF2B5EF4-FFF2-40B4-BE49-F238E27FC236}">
-                <a16:creationId xmlns:a16="http://schemas.microsoft.com/office/drawing/2014/main" id="{0C045019-B7CC-4A6E-9CB1-1AB2870096CF}"/>
+          <p:cNvPr id="18" name="CuadroTexto 17">
+            <a:extLst>
+              <a:ext uri="{FF2B5EF4-FFF2-40B4-BE49-F238E27FC236}">
+                <a16:creationId xmlns:a16="http://schemas.microsoft.com/office/drawing/2014/main" id="{9898DF31-EB59-43BC-9039-CB0673664ECD}"/>
               </a:ext>
             </a:extLst>
           </p:cNvPr>
@@ -6314,8 +6235,8 @@
         </p:nvSpPr>
         <p:spPr>
           <a:xfrm>
-            <a:off x="1132112" y="2004908"/>
-            <a:ext cx="3393235" cy="369332"/>
+            <a:off x="1132113" y="6447509"/>
+            <a:ext cx="5287347" cy="261610"/>
           </a:xfrm>
           <a:prstGeom prst="rect">
             <a:avLst/>
@@ -6329,19 +6250,31 @@
           <a:lstStyle/>
           <a:p>
             <a:r>
-              <a:rPr lang="es-ES" dirty="0"/>
-              <a:t>Serie Lynx + Ajuste</a:t>
-            </a:r>
-            <a:endParaRPr lang="en-US" dirty="0"/>
-          </a:p>
-        </p:txBody>
-      </p:sp>
-      <p:sp>
-        <p:nvSpPr>
-          <p:cNvPr id="10" name="CuadroTexto 9">
-            <a:extLst>
-              <a:ext uri="{FF2B5EF4-FFF2-40B4-BE49-F238E27FC236}">
-                <a16:creationId xmlns:a16="http://schemas.microsoft.com/office/drawing/2014/main" id="{189C76B9-24B9-4197-912D-DD17FAD34DBC}"/>
+              <a:rPr lang="es-ES" sz="1100" dirty="0">
+                <a:solidFill>
+                  <a:schemeClr val="accent2">
+                    <a:lumMod val="50000"/>
+                  </a:schemeClr>
+                </a:solidFill>
+              </a:rPr>
+              <a:t>Población Norteamericana de Linces desde 1820 a 1920 </a:t>
+            </a:r>
+            <a:endParaRPr lang="en-US" sz="1100" dirty="0">
+              <a:solidFill>
+                <a:schemeClr val="accent2">
+                  <a:lumMod val="50000"/>
+                </a:schemeClr>
+              </a:solidFill>
+            </a:endParaRPr>
+          </a:p>
+        </p:txBody>
+      </p:sp>
+      <p:sp>
+        <p:nvSpPr>
+          <p:cNvPr id="9" name="CuadroTexto 8">
+            <a:extLst>
+              <a:ext uri="{FF2B5EF4-FFF2-40B4-BE49-F238E27FC236}">
+                <a16:creationId xmlns:a16="http://schemas.microsoft.com/office/drawing/2014/main" id="{4393D686-C0A9-4CE1-8EF4-E502DD77CBB9}"/>
               </a:ext>
             </a:extLst>
           </p:cNvPr>
@@ -6350,8 +6283,8 @@
         </p:nvSpPr>
         <p:spPr>
           <a:xfrm>
-            <a:off x="7147248" y="4898570"/>
-            <a:ext cx="4432041" cy="646331"/>
+            <a:off x="7039990" y="3429000"/>
+            <a:ext cx="4842588" cy="369332"/>
           </a:xfrm>
           <a:prstGeom prst="rect">
             <a:avLst/>
@@ -6364,84 +6297,79 @@
           </a:bodyPr>
           <a:lstStyle/>
           <a:p>
-            <a:r>
-              <a:rPr lang="es-ES" dirty="0">
-                <a:solidFill>
-                  <a:srgbClr val="A80000"/>
-                </a:solidFill>
-              </a:rPr>
-              <a:t>¿Somos capaces entonces de hacer una predicción con éstos datos?</a:t>
-            </a:r>
-            <a:endParaRPr lang="en-US" dirty="0">
-              <a:solidFill>
-                <a:srgbClr val="A80000"/>
-              </a:solidFill>
-            </a:endParaRPr>
-          </a:p>
-        </p:txBody>
-      </p:sp>
-      <p:sp>
-        <p:nvSpPr>
-          <p:cNvPr id="11" name="Flecha: cheurón 10">
-            <a:extLst>
-              <a:ext uri="{FF2B5EF4-FFF2-40B4-BE49-F238E27FC236}">
-                <a16:creationId xmlns:a16="http://schemas.microsoft.com/office/drawing/2014/main" id="{B7A28142-EF9C-4ABD-8738-7309386CE5EB}"/>
-              </a:ext>
-            </a:extLst>
-          </p:cNvPr>
-          <p:cNvSpPr/>
+            <a:pPr marL="342900" indent="-342900">
+              <a:buAutoNum type="arabicPeriod"/>
+            </a:pPr>
+            <a:r>
+              <a:rPr lang="es-ES" dirty="0"/>
+              <a:t>Análisis</a:t>
+            </a:r>
+          </a:p>
+        </p:txBody>
+      </p:sp>
+      <p:sp>
+        <p:nvSpPr>
+          <p:cNvPr id="10" name="CuadroTexto 9">
+            <a:extLst>
+              <a:ext uri="{FF2B5EF4-FFF2-40B4-BE49-F238E27FC236}">
+                <a16:creationId xmlns:a16="http://schemas.microsoft.com/office/drawing/2014/main" id="{D535CA0A-C0FA-4AAF-BBAA-F0D0995EAE55}"/>
+              </a:ext>
+            </a:extLst>
+          </p:cNvPr>
+          <p:cNvSpPr txBox="1"/>
           <p:nvPr/>
         </p:nvSpPr>
         <p:spPr>
-          <a:xfrm rot="5400000">
-            <a:off x="8989728" y="4281787"/>
-            <a:ext cx="348587" cy="678415"/>
-          </a:xfrm>
-          <a:prstGeom prst="chevron">
+          <a:xfrm>
+            <a:off x="6945533" y="4175620"/>
+            <a:ext cx="4842588" cy="1200329"/>
+          </a:xfrm>
+          <a:prstGeom prst="rect">
             <a:avLst/>
           </a:prstGeom>
-          <a:solidFill>
-            <a:srgbClr val="001C54"/>
-          </a:solidFill>
-          <a:ln>
-            <a:solidFill>
-              <a:schemeClr val="bg1"/>
-            </a:solidFill>
-          </a:ln>
-        </p:spPr>
-        <p:style>
-          <a:lnRef idx="2">
-            <a:schemeClr val="accent1">
-              <a:shade val="50000"/>
-            </a:schemeClr>
-          </a:lnRef>
-          <a:fillRef idx="1">
-            <a:schemeClr val="accent1"/>
-          </a:fillRef>
-          <a:effectRef idx="0">
-            <a:schemeClr val="accent1"/>
-          </a:effectRef>
-          <a:fontRef idx="minor">
-            <a:schemeClr val="lt1"/>
-          </a:fontRef>
-        </p:style>
-        <p:txBody>
-          <a:bodyPr rtlCol="0" anchor="ctr"/>
-          <a:lstStyle/>
-          <a:p>
-            <a:pPr algn="ctr"/>
-            <a:endParaRPr lang="en-US" dirty="0">
-              <a:solidFill>
-                <a:schemeClr val="tx1"/>
-              </a:solidFill>
-            </a:endParaRPr>
+          <a:noFill/>
+        </p:spPr>
+        <p:txBody>
+          <a:bodyPr wrap="square" rtlCol="0">
+            <a:spAutoFit/>
+          </a:bodyPr>
+          <a:lstStyle/>
+          <a:p>
+            <a:pPr marL="285750" indent="-285750">
+              <a:buFont typeface="Arial" panose="020B0604020202020204" pitchFamily="34" charset="0"/>
+              <a:buChar char="•"/>
+            </a:pPr>
+            <a:r>
+              <a:rPr lang="es-ES" dirty="0"/>
+              <a:t>¿Qué tendencia tiene?</a:t>
+            </a:r>
+          </a:p>
+          <a:p>
+            <a:pPr marL="285750" indent="-285750">
+              <a:buFont typeface="Arial" panose="020B0604020202020204" pitchFamily="34" charset="0"/>
+              <a:buChar char="•"/>
+            </a:pPr>
+            <a:r>
+              <a:rPr lang="es-ES" dirty="0"/>
+              <a:t>¿Su media y varianza son constantes?</a:t>
+            </a:r>
+          </a:p>
+          <a:p>
+            <a:pPr marL="285750" indent="-285750">
+              <a:buFont typeface="Arial" panose="020B0604020202020204" pitchFamily="34" charset="0"/>
+              <a:buChar char="•"/>
+            </a:pPr>
+            <a:r>
+              <a:rPr lang="es-ES" dirty="0"/>
+              <a:t>¿Tiene una estacionalidad? ¿Cada cuántos períodos?</a:t>
+            </a:r>
           </a:p>
         </p:txBody>
       </p:sp>
     </p:spTree>
     <p:extLst>
       <p:ext uri="{BB962C8B-B14F-4D97-AF65-F5344CB8AC3E}">
-        <p14:creationId xmlns:p14="http://schemas.microsoft.com/office/powerpoint/2010/main" val="1354483368"/>
+        <p14:creationId xmlns:p14="http://schemas.microsoft.com/office/powerpoint/2010/main" val="3509174910"/>
       </p:ext>
     </p:extLst>
   </p:cSld>
@@ -6482,7 +6410,7 @@
                                           </p:stCondLst>
                                         </p:cTn>
                                         <p:tgtEl>
-                                          <p:spTgt spid="11"/>
+                                          <p:spTgt spid="9"/>
                                         </p:tgtEl>
                                         <p:attrNameLst>
                                           <p:attrName>style.visibility</p:attrName>
@@ -6495,15 +6423,33 @@
                                   </p:childTnLst>
                                 </p:cTn>
                               </p:par>
+                            </p:childTnLst>
+                          </p:cTn>
+                        </p:par>
+                      </p:childTnLst>
+                    </p:cTn>
+                  </p:par>
+                  <p:par>
+                    <p:cTn id="7" fill="hold">
+                      <p:stCondLst>
+                        <p:cond delay="indefinite"/>
+                      </p:stCondLst>
+                      <p:childTnLst>
+                        <p:par>
+                          <p:cTn id="8" fill="hold">
+                            <p:stCondLst>
+                              <p:cond delay="0"/>
+                            </p:stCondLst>
+                            <p:childTnLst>
                               <p:par>
-                                <p:cTn id="7" presetID="1" presetClass="entr" presetSubtype="0" fill="hold" grpId="0" nodeType="withEffect">
+                                <p:cTn id="9" presetID="1" presetClass="entr" presetSubtype="0" fill="hold" grpId="0" nodeType="clickEffect">
                                   <p:stCondLst>
                                     <p:cond delay="0"/>
                                   </p:stCondLst>
                                   <p:childTnLst>
                                     <p:set>
                                       <p:cBhvr>
-                                        <p:cTn id="8" dur="1" fill="hold">
+                                        <p:cTn id="10" dur="1" fill="hold">
                                           <p:stCondLst>
                                             <p:cond delay="0"/>
                                           </p:stCondLst>
@@ -6550,8 +6496,8 @@
       </p:par>
     </p:tnLst>
     <p:bldLst>
+      <p:bldP spid="9" grpId="0"/>
       <p:bldP spid="10" grpId="0"/>
-      <p:bldP spid="11" grpId="0" animBg="1"/>
     </p:bldLst>
   </p:timing>
 </p:sld>
@@ -6698,6 +6644,760 @@
       </p:sp>
       <p:pic>
         <p:nvPicPr>
+          <p:cNvPr id="4" name="Imagen 3">
+            <a:extLst>
+              <a:ext uri="{FF2B5EF4-FFF2-40B4-BE49-F238E27FC236}">
+                <a16:creationId xmlns:a16="http://schemas.microsoft.com/office/drawing/2014/main" id="{BE87692F-26F5-46A8-804C-51ABC84F9175}"/>
+              </a:ext>
+            </a:extLst>
+          </p:cNvPr>
+          <p:cNvPicPr>
+            <a:picLocks noChangeAspect="1"/>
+          </p:cNvPicPr>
+          <p:nvPr/>
+        </p:nvPicPr>
+        <p:blipFill>
+          <a:blip r:embed="rId2"/>
+          <a:stretch>
+            <a:fillRect/>
+          </a:stretch>
+        </p:blipFill>
+        <p:spPr>
+          <a:xfrm>
+            <a:off x="387010" y="1996040"/>
+            <a:ext cx="5708990" cy="4451469"/>
+          </a:xfrm>
+          <a:prstGeom prst="rect">
+            <a:avLst/>
+          </a:prstGeom>
+        </p:spPr>
+      </p:pic>
+      <p:sp>
+        <p:nvSpPr>
+          <p:cNvPr id="5" name="CuadroTexto 4">
+            <a:extLst>
+              <a:ext uri="{FF2B5EF4-FFF2-40B4-BE49-F238E27FC236}">
+                <a16:creationId xmlns:a16="http://schemas.microsoft.com/office/drawing/2014/main" id="{0C045019-B7CC-4A6E-9CB1-1AB2870096CF}"/>
+              </a:ext>
+            </a:extLst>
+          </p:cNvPr>
+          <p:cNvSpPr txBox="1"/>
+          <p:nvPr/>
+        </p:nvSpPr>
+        <p:spPr>
+          <a:xfrm>
+            <a:off x="1132112" y="2004908"/>
+            <a:ext cx="3393235" cy="369332"/>
+          </a:xfrm>
+          <a:prstGeom prst="rect">
+            <a:avLst/>
+          </a:prstGeom>
+          <a:noFill/>
+        </p:spPr>
+        <p:txBody>
+          <a:bodyPr wrap="square" rtlCol="0">
+            <a:spAutoFit/>
+          </a:bodyPr>
+          <a:lstStyle/>
+          <a:p>
+            <a:r>
+              <a:rPr lang="es-ES" dirty="0"/>
+              <a:t>Serie Lynx + Ajuste</a:t>
+            </a:r>
+            <a:endParaRPr lang="en-US" dirty="0"/>
+          </a:p>
+        </p:txBody>
+      </p:sp>
+      <p:sp>
+        <p:nvSpPr>
+          <p:cNvPr id="12" name="CuadroTexto 11">
+            <a:extLst>
+              <a:ext uri="{FF2B5EF4-FFF2-40B4-BE49-F238E27FC236}">
+                <a16:creationId xmlns:a16="http://schemas.microsoft.com/office/drawing/2014/main" id="{5D4D1A7F-DA2F-4331-93C0-9D2C5C6BCBEF}"/>
+              </a:ext>
+            </a:extLst>
+          </p:cNvPr>
+          <p:cNvSpPr txBox="1"/>
+          <p:nvPr/>
+        </p:nvSpPr>
+        <p:spPr>
+          <a:xfrm>
+            <a:off x="7039990" y="3798332"/>
+            <a:ext cx="4842588" cy="369332"/>
+          </a:xfrm>
+          <a:prstGeom prst="rect">
+            <a:avLst/>
+          </a:prstGeom>
+          <a:noFill/>
+        </p:spPr>
+        <p:txBody>
+          <a:bodyPr wrap="square" rtlCol="0">
+            <a:spAutoFit/>
+          </a:bodyPr>
+          <a:lstStyle/>
+          <a:p>
+            <a:r>
+              <a:rPr lang="es-ES" dirty="0"/>
+              <a:t>2.   Ajuste a Pasado</a:t>
+            </a:r>
+          </a:p>
+        </p:txBody>
+      </p:sp>
+      <p:sp>
+        <p:nvSpPr>
+          <p:cNvPr id="13" name="CuadroTexto 12">
+            <a:extLst>
+              <a:ext uri="{FF2B5EF4-FFF2-40B4-BE49-F238E27FC236}">
+                <a16:creationId xmlns:a16="http://schemas.microsoft.com/office/drawing/2014/main" id="{283EF380-8392-42E6-8A6F-D1E9565893F7}"/>
+              </a:ext>
+            </a:extLst>
+          </p:cNvPr>
+          <p:cNvSpPr txBox="1"/>
+          <p:nvPr/>
+        </p:nvSpPr>
+        <p:spPr>
+          <a:xfrm>
+            <a:off x="7039990" y="3429000"/>
+            <a:ext cx="4842588" cy="369332"/>
+          </a:xfrm>
+          <a:prstGeom prst="rect">
+            <a:avLst/>
+          </a:prstGeom>
+          <a:noFill/>
+        </p:spPr>
+        <p:txBody>
+          <a:bodyPr wrap="square" rtlCol="0">
+            <a:spAutoFit/>
+          </a:bodyPr>
+          <a:lstStyle/>
+          <a:p>
+            <a:pPr marL="342900" indent="-342900">
+              <a:buAutoNum type="arabicPeriod"/>
+            </a:pPr>
+            <a:r>
+              <a:rPr lang="es-ES" dirty="0"/>
+              <a:t>Análisis</a:t>
+            </a:r>
+          </a:p>
+        </p:txBody>
+      </p:sp>
+      <p:sp>
+        <p:nvSpPr>
+          <p:cNvPr id="15" name="CuadroTexto 14">
+            <a:extLst>
+              <a:ext uri="{FF2B5EF4-FFF2-40B4-BE49-F238E27FC236}">
+                <a16:creationId xmlns:a16="http://schemas.microsoft.com/office/drawing/2014/main" id="{154EBFFC-AD33-4383-822D-20ED07A010C9}"/>
+              </a:ext>
+            </a:extLst>
+          </p:cNvPr>
+          <p:cNvSpPr txBox="1"/>
+          <p:nvPr/>
+        </p:nvSpPr>
+        <p:spPr>
+          <a:xfrm>
+            <a:off x="6962402" y="4536996"/>
+            <a:ext cx="4842588" cy="1200329"/>
+          </a:xfrm>
+          <a:prstGeom prst="rect">
+            <a:avLst/>
+          </a:prstGeom>
+          <a:noFill/>
+        </p:spPr>
+        <p:txBody>
+          <a:bodyPr wrap="square" rtlCol="0">
+            <a:spAutoFit/>
+          </a:bodyPr>
+          <a:lstStyle/>
+          <a:p>
+            <a:pPr marL="285750" indent="-285750">
+              <a:buFont typeface="Arial" panose="020B0604020202020204" pitchFamily="34" charset="0"/>
+              <a:buChar char="•"/>
+            </a:pPr>
+            <a:r>
+              <a:rPr lang="es-ES" dirty="0"/>
+              <a:t>¿Qué tipo de modelo es mejor para ésta serie?</a:t>
+            </a:r>
+          </a:p>
+          <a:p>
+            <a:pPr marL="285750" indent="-285750">
+              <a:buFont typeface="Arial" panose="020B0604020202020204" pitchFamily="34" charset="0"/>
+              <a:buChar char="•"/>
+            </a:pPr>
+            <a:r>
+              <a:rPr lang="es-ES" dirty="0"/>
+              <a:t>¿Qué ecuación es la que más se ajusta a mis datos?</a:t>
+            </a:r>
+          </a:p>
+        </p:txBody>
+      </p:sp>
+    </p:spTree>
+    <p:extLst>
+      <p:ext uri="{BB962C8B-B14F-4D97-AF65-F5344CB8AC3E}">
+        <p14:creationId xmlns:p14="http://schemas.microsoft.com/office/powerpoint/2010/main" val="1354483368"/>
+      </p:ext>
+    </p:extLst>
+  </p:cSld>
+  <p:clrMapOvr>
+    <a:masterClrMapping/>
+  </p:clrMapOvr>
+  <p:timing>
+    <p:tnLst>
+      <p:par>
+        <p:cTn id="1" dur="indefinite" restart="never" nodeType="tmRoot">
+          <p:childTnLst>
+            <p:seq concurrent="1" nextAc="seek">
+              <p:cTn id="2" dur="indefinite" nodeType="mainSeq">
+                <p:childTnLst>
+                  <p:par>
+                    <p:cTn id="3" fill="hold">
+                      <p:stCondLst>
+                        <p:cond delay="indefinite"/>
+                      </p:stCondLst>
+                      <p:childTnLst>
+                        <p:par>
+                          <p:cTn id="4" fill="hold">
+                            <p:stCondLst>
+                              <p:cond delay="0"/>
+                            </p:stCondLst>
+                            <p:childTnLst>
+                              <p:par>
+                                <p:cTn id="5" presetID="1" presetClass="entr" presetSubtype="0" fill="hold" grpId="0" nodeType="clickEffect">
+                                  <p:stCondLst>
+                                    <p:cond delay="0"/>
+                                  </p:stCondLst>
+                                  <p:childTnLst>
+                                    <p:set>
+                                      <p:cBhvr>
+                                        <p:cTn id="6" dur="1" fill="hold">
+                                          <p:stCondLst>
+                                            <p:cond delay="0"/>
+                                          </p:stCondLst>
+                                        </p:cTn>
+                                        <p:tgtEl>
+                                          <p:spTgt spid="12"/>
+                                        </p:tgtEl>
+                                        <p:attrNameLst>
+                                          <p:attrName>style.visibility</p:attrName>
+                                        </p:attrNameLst>
+                                      </p:cBhvr>
+                                      <p:to>
+                                        <p:strVal val="visible"/>
+                                      </p:to>
+                                    </p:set>
+                                  </p:childTnLst>
+                                </p:cTn>
+                              </p:par>
+                            </p:childTnLst>
+                          </p:cTn>
+                        </p:par>
+                      </p:childTnLst>
+                    </p:cTn>
+                  </p:par>
+                  <p:par>
+                    <p:cTn id="7" fill="hold">
+                      <p:stCondLst>
+                        <p:cond delay="indefinite"/>
+                      </p:stCondLst>
+                      <p:childTnLst>
+                        <p:par>
+                          <p:cTn id="8" fill="hold">
+                            <p:stCondLst>
+                              <p:cond delay="0"/>
+                            </p:stCondLst>
+                            <p:childTnLst>
+                              <p:par>
+                                <p:cTn id="9" presetID="1" presetClass="entr" presetSubtype="0" fill="hold" grpId="0" nodeType="clickEffect">
+                                  <p:stCondLst>
+                                    <p:cond delay="0"/>
+                                  </p:stCondLst>
+                                  <p:childTnLst>
+                                    <p:set>
+                                      <p:cBhvr>
+                                        <p:cTn id="10" dur="1" fill="hold">
+                                          <p:stCondLst>
+                                            <p:cond delay="0"/>
+                                          </p:stCondLst>
+                                        </p:cTn>
+                                        <p:tgtEl>
+                                          <p:spTgt spid="15"/>
+                                        </p:tgtEl>
+                                        <p:attrNameLst>
+                                          <p:attrName>style.visibility</p:attrName>
+                                        </p:attrNameLst>
+                                      </p:cBhvr>
+                                      <p:to>
+                                        <p:strVal val="visible"/>
+                                      </p:to>
+                                    </p:set>
+                                  </p:childTnLst>
+                                </p:cTn>
+                              </p:par>
+                            </p:childTnLst>
+                          </p:cTn>
+                        </p:par>
+                      </p:childTnLst>
+                    </p:cTn>
+                  </p:par>
+                </p:childTnLst>
+              </p:cTn>
+              <p:prevCondLst>
+                <p:cond evt="onPrev" delay="0">
+                  <p:tgtEl>
+                    <p:sldTgt/>
+                  </p:tgtEl>
+                </p:cond>
+              </p:prevCondLst>
+              <p:nextCondLst>
+                <p:cond evt="onNext" delay="0">
+                  <p:tgtEl>
+                    <p:sldTgt/>
+                  </p:tgtEl>
+                </p:cond>
+              </p:nextCondLst>
+            </p:seq>
+          </p:childTnLst>
+        </p:cTn>
+      </p:par>
+    </p:tnLst>
+    <p:bldLst>
+      <p:bldP spid="12" grpId="0"/>
+      <p:bldP spid="15" grpId="0"/>
+    </p:bldLst>
+  </p:timing>
+</p:sld>
+</file>
+
+<file path=ppt/slides/slide15.xml><?xml version="1.0" encoding="utf-8"?>
+<p:sld xmlns:a="http://schemas.openxmlformats.org/drawingml/2006/main" xmlns:r="http://schemas.openxmlformats.org/officeDocument/2006/relationships" xmlns:p="http://schemas.openxmlformats.org/presentationml/2006/main">
+  <p:cSld>
+    <p:spTree>
+      <p:nvGrpSpPr>
+        <p:cNvPr id="1" name=""/>
+        <p:cNvGrpSpPr/>
+        <p:nvPr/>
+      </p:nvGrpSpPr>
+      <p:grpSpPr>
+        <a:xfrm>
+          <a:off x="0" y="0"/>
+          <a:ext cx="0" cy="0"/>
+          <a:chOff x="0" y="0"/>
+          <a:chExt cx="0" cy="0"/>
+        </a:xfrm>
+      </p:grpSpPr>
+      <p:sp>
+        <p:nvSpPr>
+          <p:cNvPr id="22" name="CuadroTexto 21">
+            <a:extLst>
+              <a:ext uri="{FF2B5EF4-FFF2-40B4-BE49-F238E27FC236}">
+                <a16:creationId xmlns:a16="http://schemas.microsoft.com/office/drawing/2014/main" id="{5C80F593-DD2F-4F38-8160-0B4B1E5E79C5}"/>
+              </a:ext>
+            </a:extLst>
+          </p:cNvPr>
+          <p:cNvSpPr txBox="1"/>
+          <p:nvPr/>
+        </p:nvSpPr>
+        <p:spPr>
+          <a:xfrm>
+            <a:off x="7675981" y="186661"/>
+            <a:ext cx="4516019" cy="1077218"/>
+          </a:xfrm>
+          <a:prstGeom prst="rect">
+            <a:avLst/>
+          </a:prstGeom>
+          <a:noFill/>
+        </p:spPr>
+        <p:txBody>
+          <a:bodyPr wrap="square" rtlCol="0">
+            <a:spAutoFit/>
+          </a:bodyPr>
+          <a:lstStyle/>
+          <a:p>
+            <a:pPr algn="ctr"/>
+            <a:r>
+              <a:rPr lang="es-ES" sz="3200" dirty="0"/>
+              <a:t>Introducción a las series temporales</a:t>
+            </a:r>
+            <a:endParaRPr lang="en-US" sz="2800" dirty="0"/>
+          </a:p>
+        </p:txBody>
+      </p:sp>
+      <p:sp>
+        <p:nvSpPr>
+          <p:cNvPr id="43" name="CuadroTexto 42">
+            <a:extLst>
+              <a:ext uri="{FF2B5EF4-FFF2-40B4-BE49-F238E27FC236}">
+                <a16:creationId xmlns:a16="http://schemas.microsoft.com/office/drawing/2014/main" id="{47A5A277-2DCF-4F78-A2A7-6F76ED500228}"/>
+              </a:ext>
+            </a:extLst>
+          </p:cNvPr>
+          <p:cNvSpPr txBox="1"/>
+          <p:nvPr/>
+        </p:nvSpPr>
+        <p:spPr>
+          <a:xfrm>
+            <a:off x="0" y="1360657"/>
+            <a:ext cx="3874097" cy="400110"/>
+          </a:xfrm>
+          <a:prstGeom prst="rect">
+            <a:avLst/>
+          </a:prstGeom>
+          <a:noFill/>
+        </p:spPr>
+        <p:txBody>
+          <a:bodyPr wrap="square" rtlCol="0">
+            <a:spAutoFit/>
+          </a:bodyPr>
+          <a:lstStyle/>
+          <a:p>
+            <a:pPr algn="ctr"/>
+            <a:r>
+              <a:rPr lang="es-ES" sz="2000" i="1" dirty="0"/>
+              <a:t>¿Qué es una serie Temporal?</a:t>
+            </a:r>
+            <a:endParaRPr lang="en-US" i="1" dirty="0"/>
+          </a:p>
+        </p:txBody>
+      </p:sp>
+      <p:sp>
+        <p:nvSpPr>
+          <p:cNvPr id="18" name="CuadroTexto 17">
+            <a:extLst>
+              <a:ext uri="{FF2B5EF4-FFF2-40B4-BE49-F238E27FC236}">
+                <a16:creationId xmlns:a16="http://schemas.microsoft.com/office/drawing/2014/main" id="{9898DF31-EB59-43BC-9039-CB0673664ECD}"/>
+              </a:ext>
+            </a:extLst>
+          </p:cNvPr>
+          <p:cNvSpPr txBox="1"/>
+          <p:nvPr/>
+        </p:nvSpPr>
+        <p:spPr>
+          <a:xfrm>
+            <a:off x="1132113" y="6447509"/>
+            <a:ext cx="5287347" cy="261610"/>
+          </a:xfrm>
+          <a:prstGeom prst="rect">
+            <a:avLst/>
+          </a:prstGeom>
+          <a:noFill/>
+        </p:spPr>
+        <p:txBody>
+          <a:bodyPr wrap="square" rtlCol="0">
+            <a:spAutoFit/>
+          </a:bodyPr>
+          <a:lstStyle/>
+          <a:p>
+            <a:r>
+              <a:rPr lang="es-ES" sz="1100" dirty="0">
+                <a:solidFill>
+                  <a:schemeClr val="accent2">
+                    <a:lumMod val="50000"/>
+                  </a:schemeClr>
+                </a:solidFill>
+              </a:rPr>
+              <a:t>Población Norteamericana de Linces desde 1820 a 1920 </a:t>
+            </a:r>
+            <a:endParaRPr lang="en-US" sz="1100" dirty="0">
+              <a:solidFill>
+                <a:schemeClr val="accent2">
+                  <a:lumMod val="50000"/>
+                </a:schemeClr>
+              </a:solidFill>
+            </a:endParaRPr>
+          </a:p>
+        </p:txBody>
+      </p:sp>
+      <p:pic>
+        <p:nvPicPr>
+          <p:cNvPr id="7" name="Imagen 6">
+            <a:extLst>
+              <a:ext uri="{FF2B5EF4-FFF2-40B4-BE49-F238E27FC236}">
+                <a16:creationId xmlns:a16="http://schemas.microsoft.com/office/drawing/2014/main" id="{F603CD85-D674-4104-AC17-BB7192B97D3A}"/>
+              </a:ext>
+            </a:extLst>
+          </p:cNvPr>
+          <p:cNvPicPr>
+            <a:picLocks noChangeAspect="1"/>
+          </p:cNvPicPr>
+          <p:nvPr/>
+        </p:nvPicPr>
+        <p:blipFill>
+          <a:blip r:embed="rId2"/>
+          <a:stretch>
+            <a:fillRect/>
+          </a:stretch>
+        </p:blipFill>
+        <p:spPr>
+          <a:xfrm>
+            <a:off x="448041" y="2051722"/>
+            <a:ext cx="5103673" cy="4104831"/>
+          </a:xfrm>
+          <a:prstGeom prst="rect">
+            <a:avLst/>
+          </a:prstGeom>
+        </p:spPr>
+      </p:pic>
+      <p:sp>
+        <p:nvSpPr>
+          <p:cNvPr id="8" name="CuadroTexto 7">
+            <a:extLst>
+              <a:ext uri="{FF2B5EF4-FFF2-40B4-BE49-F238E27FC236}">
+                <a16:creationId xmlns:a16="http://schemas.microsoft.com/office/drawing/2014/main" id="{24CD3699-8069-4E3A-980B-301FDFB33C9B}"/>
+              </a:ext>
+            </a:extLst>
+          </p:cNvPr>
+          <p:cNvSpPr txBox="1"/>
+          <p:nvPr/>
+        </p:nvSpPr>
+        <p:spPr>
+          <a:xfrm>
+            <a:off x="7039990" y="3798332"/>
+            <a:ext cx="4842588" cy="369332"/>
+          </a:xfrm>
+          <a:prstGeom prst="rect">
+            <a:avLst/>
+          </a:prstGeom>
+          <a:noFill/>
+        </p:spPr>
+        <p:txBody>
+          <a:bodyPr wrap="square" rtlCol="0">
+            <a:spAutoFit/>
+          </a:bodyPr>
+          <a:lstStyle/>
+          <a:p>
+            <a:r>
+              <a:rPr lang="es-ES" dirty="0"/>
+              <a:t>2.   Ajuste a Pasado</a:t>
+            </a:r>
+          </a:p>
+        </p:txBody>
+      </p:sp>
+      <p:sp>
+        <p:nvSpPr>
+          <p:cNvPr id="9" name="CuadroTexto 8">
+            <a:extLst>
+              <a:ext uri="{FF2B5EF4-FFF2-40B4-BE49-F238E27FC236}">
+                <a16:creationId xmlns:a16="http://schemas.microsoft.com/office/drawing/2014/main" id="{2197AD4C-9077-4A7F-82D0-A86BC9267DFA}"/>
+              </a:ext>
+            </a:extLst>
+          </p:cNvPr>
+          <p:cNvSpPr txBox="1"/>
+          <p:nvPr/>
+        </p:nvSpPr>
+        <p:spPr>
+          <a:xfrm>
+            <a:off x="7039990" y="3429000"/>
+            <a:ext cx="4842588" cy="369332"/>
+          </a:xfrm>
+          <a:prstGeom prst="rect">
+            <a:avLst/>
+          </a:prstGeom>
+          <a:noFill/>
+        </p:spPr>
+        <p:txBody>
+          <a:bodyPr wrap="square" rtlCol="0">
+            <a:spAutoFit/>
+          </a:bodyPr>
+          <a:lstStyle/>
+          <a:p>
+            <a:pPr marL="342900" indent="-342900">
+              <a:buAutoNum type="arabicPeriod"/>
+            </a:pPr>
+            <a:r>
+              <a:rPr lang="es-ES" dirty="0"/>
+              <a:t>Análisis</a:t>
+            </a:r>
+          </a:p>
+        </p:txBody>
+      </p:sp>
+      <p:sp>
+        <p:nvSpPr>
+          <p:cNvPr id="11" name="CuadroTexto 10">
+            <a:extLst>
+              <a:ext uri="{FF2B5EF4-FFF2-40B4-BE49-F238E27FC236}">
+                <a16:creationId xmlns:a16="http://schemas.microsoft.com/office/drawing/2014/main" id="{9C541871-0774-49B7-AA52-06C67572C60A}"/>
+              </a:ext>
+            </a:extLst>
+          </p:cNvPr>
+          <p:cNvSpPr txBox="1"/>
+          <p:nvPr/>
+        </p:nvSpPr>
+        <p:spPr>
+          <a:xfrm>
+            <a:off x="7039990" y="4221774"/>
+            <a:ext cx="4842588" cy="369332"/>
+          </a:xfrm>
+          <a:prstGeom prst="rect">
+            <a:avLst/>
+          </a:prstGeom>
+          <a:noFill/>
+        </p:spPr>
+        <p:txBody>
+          <a:bodyPr wrap="square" rtlCol="0">
+            <a:spAutoFit/>
+          </a:bodyPr>
+          <a:lstStyle/>
+          <a:p>
+            <a:r>
+              <a:rPr lang="es-ES" dirty="0"/>
+              <a:t>3.   Predicción a Futuro</a:t>
+            </a:r>
+          </a:p>
+        </p:txBody>
+      </p:sp>
+    </p:spTree>
+    <p:extLst>
+      <p:ext uri="{BB962C8B-B14F-4D97-AF65-F5344CB8AC3E}">
+        <p14:creationId xmlns:p14="http://schemas.microsoft.com/office/powerpoint/2010/main" val="297336457"/>
+      </p:ext>
+    </p:extLst>
+  </p:cSld>
+  <p:clrMapOvr>
+    <a:masterClrMapping/>
+  </p:clrMapOvr>
+</p:sld>
+</file>
+
+<file path=ppt/slides/slide16.xml><?xml version="1.0" encoding="utf-8"?>
+<p:sld xmlns:a="http://schemas.openxmlformats.org/drawingml/2006/main" xmlns:r="http://schemas.openxmlformats.org/officeDocument/2006/relationships" xmlns:p="http://schemas.openxmlformats.org/presentationml/2006/main">
+  <p:cSld>
+    <p:spTree>
+      <p:nvGrpSpPr>
+        <p:cNvPr id="1" name=""/>
+        <p:cNvGrpSpPr/>
+        <p:nvPr/>
+      </p:nvGrpSpPr>
+      <p:grpSpPr>
+        <a:xfrm>
+          <a:off x="0" y="0"/>
+          <a:ext cx="0" cy="0"/>
+          <a:chOff x="0" y="0"/>
+          <a:chExt cx="0" cy="0"/>
+        </a:xfrm>
+      </p:grpSpPr>
+      <p:sp>
+        <p:nvSpPr>
+          <p:cNvPr id="22" name="CuadroTexto 21">
+            <a:extLst>
+              <a:ext uri="{FF2B5EF4-FFF2-40B4-BE49-F238E27FC236}">
+                <a16:creationId xmlns:a16="http://schemas.microsoft.com/office/drawing/2014/main" id="{5C80F593-DD2F-4F38-8160-0B4B1E5E79C5}"/>
+              </a:ext>
+            </a:extLst>
+          </p:cNvPr>
+          <p:cNvSpPr txBox="1"/>
+          <p:nvPr/>
+        </p:nvSpPr>
+        <p:spPr>
+          <a:xfrm>
+            <a:off x="7675981" y="186661"/>
+            <a:ext cx="4516019" cy="1077218"/>
+          </a:xfrm>
+          <a:prstGeom prst="rect">
+            <a:avLst/>
+          </a:prstGeom>
+          <a:noFill/>
+        </p:spPr>
+        <p:txBody>
+          <a:bodyPr wrap="square" rtlCol="0">
+            <a:spAutoFit/>
+          </a:bodyPr>
+          <a:lstStyle/>
+          <a:p>
+            <a:pPr algn="ctr"/>
+            <a:r>
+              <a:rPr lang="es-ES" sz="3200" dirty="0"/>
+              <a:t>Introducción a las series temporales</a:t>
+            </a:r>
+            <a:endParaRPr lang="en-US" sz="2800" dirty="0"/>
+          </a:p>
+        </p:txBody>
+      </p:sp>
+      <p:sp>
+        <p:nvSpPr>
+          <p:cNvPr id="43" name="CuadroTexto 42">
+            <a:extLst>
+              <a:ext uri="{FF2B5EF4-FFF2-40B4-BE49-F238E27FC236}">
+                <a16:creationId xmlns:a16="http://schemas.microsoft.com/office/drawing/2014/main" id="{47A5A277-2DCF-4F78-A2A7-6F76ED500228}"/>
+              </a:ext>
+            </a:extLst>
+          </p:cNvPr>
+          <p:cNvSpPr txBox="1"/>
+          <p:nvPr/>
+        </p:nvSpPr>
+        <p:spPr>
+          <a:xfrm>
+            <a:off x="0" y="1360657"/>
+            <a:ext cx="3874097" cy="400110"/>
+          </a:xfrm>
+          <a:prstGeom prst="rect">
+            <a:avLst/>
+          </a:prstGeom>
+          <a:noFill/>
+        </p:spPr>
+        <p:txBody>
+          <a:bodyPr wrap="square" rtlCol="0">
+            <a:spAutoFit/>
+          </a:bodyPr>
+          <a:lstStyle/>
+          <a:p>
+            <a:pPr algn="ctr"/>
+            <a:r>
+              <a:rPr lang="es-ES" sz="2000" i="1" dirty="0"/>
+              <a:t>¿Qué es una serie Temporal?</a:t>
+            </a:r>
+            <a:endParaRPr lang="en-US" i="1" dirty="0"/>
+          </a:p>
+        </p:txBody>
+      </p:sp>
+      <p:sp>
+        <p:nvSpPr>
+          <p:cNvPr id="18" name="CuadroTexto 17">
+            <a:extLst>
+              <a:ext uri="{FF2B5EF4-FFF2-40B4-BE49-F238E27FC236}">
+                <a16:creationId xmlns:a16="http://schemas.microsoft.com/office/drawing/2014/main" id="{9898DF31-EB59-43BC-9039-CB0673664ECD}"/>
+              </a:ext>
+            </a:extLst>
+          </p:cNvPr>
+          <p:cNvSpPr txBox="1"/>
+          <p:nvPr/>
+        </p:nvSpPr>
+        <p:spPr>
+          <a:xfrm>
+            <a:off x="1132113" y="6447509"/>
+            <a:ext cx="5287347" cy="261610"/>
+          </a:xfrm>
+          <a:prstGeom prst="rect">
+            <a:avLst/>
+          </a:prstGeom>
+          <a:noFill/>
+        </p:spPr>
+        <p:txBody>
+          <a:bodyPr wrap="square" rtlCol="0">
+            <a:spAutoFit/>
+          </a:bodyPr>
+          <a:lstStyle/>
+          <a:p>
+            <a:r>
+              <a:rPr lang="es-ES" sz="1100" dirty="0">
+                <a:solidFill>
+                  <a:schemeClr val="accent2">
+                    <a:lumMod val="50000"/>
+                  </a:schemeClr>
+                </a:solidFill>
+              </a:rPr>
+              <a:t>Población Norteamericana de Linces desde 1820 a 1920 </a:t>
+            </a:r>
+            <a:endParaRPr lang="en-US" sz="1100" dirty="0">
+              <a:solidFill>
+                <a:schemeClr val="accent2">
+                  <a:lumMod val="50000"/>
+                </a:schemeClr>
+              </a:solidFill>
+            </a:endParaRPr>
+          </a:p>
+        </p:txBody>
+      </p:sp>
+      <p:pic>
+        <p:nvPicPr>
           <p:cNvPr id="7" name="Imagen 6">
             <a:extLst>
               <a:ext uri="{FF2B5EF4-FFF2-40B4-BE49-F238E27FC236}">
@@ -6828,7 +7528,7 @@
     </p:spTree>
     <p:extLst>
       <p:ext uri="{BB962C8B-B14F-4D97-AF65-F5344CB8AC3E}">
-        <p14:creationId xmlns:p14="http://schemas.microsoft.com/office/powerpoint/2010/main" val="297336457"/>
+        <p14:creationId xmlns:p14="http://schemas.microsoft.com/office/powerpoint/2010/main" val="1261757386"/>
       </p:ext>
     </p:extLst>
   </p:cSld>
@@ -6962,7 +7662,7 @@
 </p:sld>
 </file>
 
-<file path=ppt/slides/slide15.xml><?xml version="1.0" encoding="utf-8"?>
+<file path=ppt/slides/slide17.xml><?xml version="1.0" encoding="utf-8"?>
 <p:sld xmlns:a="http://schemas.openxmlformats.org/drawingml/2006/main" xmlns:r="http://schemas.openxmlformats.org/officeDocument/2006/relationships" xmlns:p="http://schemas.openxmlformats.org/presentationml/2006/main">
   <p:cSld>
     <p:spTree>
@@ -6981,6 +7681,123 @@
       </p:grpSpPr>
       <p:sp>
         <p:nvSpPr>
+          <p:cNvPr id="11" name="Flecha: doblada 10">
+            <a:extLst>
+              <a:ext uri="{FF2B5EF4-FFF2-40B4-BE49-F238E27FC236}">
+                <a16:creationId xmlns:a16="http://schemas.microsoft.com/office/drawing/2014/main" id="{7C810362-4B1C-4237-90D4-E30ADB099F8A}"/>
+              </a:ext>
+            </a:extLst>
+          </p:cNvPr>
+          <p:cNvSpPr/>
+          <p:nvPr/>
+        </p:nvSpPr>
+        <p:spPr>
+          <a:xfrm rot="19365064" flipV="1">
+            <a:off x="6510811" y="5847242"/>
+            <a:ext cx="720395" cy="797334"/>
+          </a:xfrm>
+          <a:prstGeom prst="bentArrow">
+            <a:avLst>
+              <a:gd name="adj1" fmla="val 25000"/>
+              <a:gd name="adj2" fmla="val 25000"/>
+              <a:gd name="adj3" fmla="val 25000"/>
+              <a:gd name="adj4" fmla="val 75000"/>
+            </a:avLst>
+          </a:prstGeom>
+          <a:solidFill>
+            <a:schemeClr val="tx1"/>
+          </a:solidFill>
+          <a:ln>
+            <a:solidFill>
+              <a:srgbClr val="001C54"/>
+            </a:solidFill>
+          </a:ln>
+        </p:spPr>
+        <p:style>
+          <a:lnRef idx="2">
+            <a:schemeClr val="accent1">
+              <a:shade val="50000"/>
+            </a:schemeClr>
+          </a:lnRef>
+          <a:fillRef idx="1">
+            <a:schemeClr val="accent1"/>
+          </a:fillRef>
+          <a:effectRef idx="0">
+            <a:schemeClr val="accent1"/>
+          </a:effectRef>
+          <a:fontRef idx="minor">
+            <a:schemeClr val="lt1"/>
+          </a:fontRef>
+        </p:style>
+        <p:txBody>
+          <a:bodyPr rtlCol="0" anchor="ctr"/>
+          <a:lstStyle/>
+          <a:p>
+            <a:pPr algn="ctr"/>
+            <a:endParaRPr lang="en-US" dirty="0">
+              <a:solidFill>
+                <a:schemeClr val="tx1"/>
+              </a:solidFill>
+            </a:endParaRPr>
+          </a:p>
+        </p:txBody>
+      </p:sp>
+      <p:sp>
+        <p:nvSpPr>
+          <p:cNvPr id="4" name="Rectángulo 3">
+            <a:extLst>
+              <a:ext uri="{FF2B5EF4-FFF2-40B4-BE49-F238E27FC236}">
+                <a16:creationId xmlns:a16="http://schemas.microsoft.com/office/drawing/2014/main" id="{63A91828-C052-4F16-BC67-D0C09124DB05}"/>
+              </a:ext>
+            </a:extLst>
+          </p:cNvPr>
+          <p:cNvSpPr/>
+          <p:nvPr/>
+        </p:nvSpPr>
+        <p:spPr>
+          <a:xfrm>
+            <a:off x="6212079" y="6185183"/>
+            <a:ext cx="442937" cy="450055"/>
+          </a:xfrm>
+          <a:prstGeom prst="rect">
+            <a:avLst/>
+          </a:prstGeom>
+          <a:solidFill>
+            <a:schemeClr val="bg1"/>
+          </a:solidFill>
+          <a:ln>
+            <a:solidFill>
+              <a:schemeClr val="bg1"/>
+            </a:solidFill>
+          </a:ln>
+        </p:spPr>
+        <p:style>
+          <a:lnRef idx="2">
+            <a:schemeClr val="accent1">
+              <a:shade val="50000"/>
+            </a:schemeClr>
+          </a:lnRef>
+          <a:fillRef idx="1">
+            <a:schemeClr val="accent1"/>
+          </a:fillRef>
+          <a:effectRef idx="0">
+            <a:schemeClr val="accent1"/>
+          </a:effectRef>
+          <a:fontRef idx="minor">
+            <a:schemeClr val="lt1"/>
+          </a:fontRef>
+        </p:style>
+        <p:txBody>
+          <a:bodyPr rtlCol="0" anchor="ctr"/>
+          <a:lstStyle/>
+          <a:p>
+            <a:pPr algn="ctr"/>
+            <a:endParaRPr lang="en-US"/>
+          </a:p>
+        </p:txBody>
+      </p:sp>
+      <p:sp>
+        <p:nvSpPr>
           <p:cNvPr id="22" name="CuadroTexto 21">
             <a:extLst>
               <a:ext uri="{FF2B5EF4-FFF2-40B4-BE49-F238E27FC236}">
@@ -7295,6 +8112,57 @@
           </a:p>
         </p:txBody>
       </p:sp>
+      <p:sp>
+        <p:nvSpPr>
+          <p:cNvPr id="10" name="CuadroTexto 9">
+            <a:extLst>
+              <a:ext uri="{FF2B5EF4-FFF2-40B4-BE49-F238E27FC236}">
+                <a16:creationId xmlns:a16="http://schemas.microsoft.com/office/drawing/2014/main" id="{4D257BB2-A4F9-4E45-9F7A-44DB6DB486C8}"/>
+              </a:ext>
+            </a:extLst>
+          </p:cNvPr>
+          <p:cNvSpPr txBox="1"/>
+          <p:nvPr/>
+        </p:nvSpPr>
+        <p:spPr>
+          <a:xfrm>
+            <a:off x="7298603" y="5639250"/>
+            <a:ext cx="1747659" cy="646331"/>
+          </a:xfrm>
+          <a:prstGeom prst="rect">
+            <a:avLst/>
+          </a:prstGeom>
+          <a:solidFill>
+            <a:schemeClr val="bg1"/>
+          </a:solidFill>
+          <a:ln>
+            <a:solidFill>
+              <a:srgbClr val="A80000"/>
+            </a:solidFill>
+          </a:ln>
+        </p:spPr>
+        <p:txBody>
+          <a:bodyPr wrap="square" rtlCol="0">
+            <a:spAutoFit/>
+          </a:bodyPr>
+          <a:lstStyle/>
+          <a:p>
+            <a:r>
+              <a:rPr lang="es-ES" dirty="0">
+                <a:solidFill>
+                  <a:srgbClr val="A80000"/>
+                </a:solidFill>
+              </a:rPr>
+              <a:t>¿Es esto ruido blanco? </a:t>
+            </a:r>
+            <a:endParaRPr lang="en-US" dirty="0">
+              <a:solidFill>
+                <a:srgbClr val="A80000"/>
+              </a:solidFill>
+            </a:endParaRPr>
+          </a:p>
+        </p:txBody>
+      </p:sp>
     </p:spTree>
     <p:extLst>
       <p:ext uri="{BB962C8B-B14F-4D97-AF65-F5344CB8AC3E}">
@@ -7305,10 +8173,116 @@
   <p:clrMapOvr>
     <a:masterClrMapping/>
   </p:clrMapOvr>
+  <p:timing>
+    <p:tnLst>
+      <p:par>
+        <p:cTn id="1" dur="indefinite" restart="never" nodeType="tmRoot">
+          <p:childTnLst>
+            <p:seq concurrent="1" nextAc="seek">
+              <p:cTn id="2" dur="indefinite" nodeType="mainSeq">
+                <p:childTnLst>
+                  <p:par>
+                    <p:cTn id="3" fill="hold">
+                      <p:stCondLst>
+                        <p:cond delay="indefinite"/>
+                      </p:stCondLst>
+                      <p:childTnLst>
+                        <p:par>
+                          <p:cTn id="4" fill="hold">
+                            <p:stCondLst>
+                              <p:cond delay="0"/>
+                            </p:stCondLst>
+                            <p:childTnLst>
+                              <p:par>
+                                <p:cTn id="5" presetID="1" presetClass="entr" presetSubtype="0" fill="hold" grpId="0" nodeType="clickEffect">
+                                  <p:stCondLst>
+                                    <p:cond delay="0"/>
+                                  </p:stCondLst>
+                                  <p:childTnLst>
+                                    <p:set>
+                                      <p:cBhvr>
+                                        <p:cTn id="6" dur="1" fill="hold">
+                                          <p:stCondLst>
+                                            <p:cond delay="0"/>
+                                          </p:stCondLst>
+                                        </p:cTn>
+                                        <p:tgtEl>
+                                          <p:spTgt spid="10"/>
+                                        </p:tgtEl>
+                                        <p:attrNameLst>
+                                          <p:attrName>style.visibility</p:attrName>
+                                        </p:attrNameLst>
+                                      </p:cBhvr>
+                                      <p:to>
+                                        <p:strVal val="visible"/>
+                                      </p:to>
+                                    </p:set>
+                                  </p:childTnLst>
+                                </p:cTn>
+                              </p:par>
+                              <p:par>
+                                <p:cTn id="7" presetID="1" presetClass="entr" presetSubtype="0" fill="hold" grpId="0" nodeType="withEffect">
+                                  <p:stCondLst>
+                                    <p:cond delay="0"/>
+                                  </p:stCondLst>
+                                  <p:childTnLst>
+                                    <p:set>
+                                      <p:cBhvr>
+                                        <p:cTn id="8" dur="1" fill="hold">
+                                          <p:stCondLst>
+                                            <p:cond delay="0"/>
+                                          </p:stCondLst>
+                                        </p:cTn>
+                                        <p:tgtEl>
+                                          <p:spTgt spid="11"/>
+                                        </p:tgtEl>
+                                        <p:attrNameLst>
+                                          <p:attrName>style.visibility</p:attrName>
+                                        </p:attrNameLst>
+                                      </p:cBhvr>
+                                      <p:to>
+                                        <p:strVal val="visible"/>
+                                      </p:to>
+                                    </p:set>
+                                  </p:childTnLst>
+                                </p:cTn>
+                              </p:par>
+                            </p:childTnLst>
+                          </p:cTn>
+                        </p:par>
+                      </p:childTnLst>
+                    </p:cTn>
+                  </p:par>
+                </p:childTnLst>
+              </p:cTn>
+              <p:prevCondLst>
+                <p:cond evt="onPrev" delay="0">
+                  <p:tgtEl>
+                    <p:sldTgt/>
+                  </p:tgtEl>
+                </p:cond>
+              </p:prevCondLst>
+              <p:nextCondLst>
+                <p:cond evt="onNext" delay="0">
+                  <p:tgtEl>
+                    <p:sldTgt/>
+                  </p:tgtEl>
+                </p:cond>
+              </p:nextCondLst>
+            </p:seq>
+          </p:childTnLst>
+        </p:cTn>
+      </p:par>
+    </p:tnLst>
+    <p:bldLst>
+      <p:bldP spid="11" grpId="0" animBg="1"/>
+      <p:bldP spid="10" grpId="0" animBg="1"/>
+    </p:bldLst>
+  </p:timing>
 </p:sld>
 </file>
 
-<file path=ppt/slides/slide16.xml><?xml version="1.0" encoding="utf-8"?>
+<file path=ppt/slides/slide18.xml><?xml version="1.0" encoding="utf-8"?>
 <p:sld xmlns:a="http://schemas.openxmlformats.org/drawingml/2006/main" xmlns:r="http://schemas.openxmlformats.org/officeDocument/2006/relationships" xmlns:p="http://schemas.openxmlformats.org/presentationml/2006/main">
   <p:cSld>
     <p:spTree>
@@ -7766,7 +8740,7 @@
 </p:sld>
 </file>
 
-<file path=ppt/slides/slide17.xml><?xml version="1.0" encoding="utf-8"?>
+<file path=ppt/slides/slide19.xml><?xml version="1.0" encoding="utf-8"?>
 <p:sld xmlns:a="http://schemas.openxmlformats.org/drawingml/2006/main" xmlns:r="http://schemas.openxmlformats.org/officeDocument/2006/relationships" xmlns:p="http://schemas.openxmlformats.org/presentationml/2006/main">
   <p:cSld>
     <p:spTree>
@@ -8333,10 +9307,10 @@
       </p:sp>
       <p:sp>
         <p:nvSpPr>
-          <p:cNvPr id="16" name="Flecha: doblada 15">
-            <a:extLst>
-              <a:ext uri="{FF2B5EF4-FFF2-40B4-BE49-F238E27FC236}">
-                <a16:creationId xmlns:a16="http://schemas.microsoft.com/office/drawing/2014/main" id="{BF7E68A0-4F4E-4698-95F3-436B3890C912}"/>
+          <p:cNvPr id="12" name="Flecha: a la derecha 11">
+            <a:extLst>
+              <a:ext uri="{FF2B5EF4-FFF2-40B4-BE49-F238E27FC236}">
+                <a16:creationId xmlns:a16="http://schemas.microsoft.com/office/drawing/2014/main" id="{ED6B3157-2252-4436-B4C3-642D28F357F5}"/>
               </a:ext>
             </a:extLst>
           </p:cNvPr>
@@ -8344,17 +9318,12 @@
           <p:nvPr/>
         </p:nvSpPr>
         <p:spPr>
-          <a:xfrm rot="18142551" flipV="1">
-            <a:off x="8173262" y="4347915"/>
-            <a:ext cx="551853" cy="621565"/>
-          </a:xfrm>
-          <a:prstGeom prst="bentArrow">
-            <a:avLst>
-              <a:gd name="adj1" fmla="val 25000"/>
-              <a:gd name="adj2" fmla="val 25000"/>
-              <a:gd name="adj3" fmla="val 25000"/>
-              <a:gd name="adj4" fmla="val 75000"/>
-            </a:avLst>
+          <a:xfrm rot="20260084">
+            <a:off x="7683410" y="5003653"/>
+            <a:ext cx="1066477" cy="249608"/>
+          </a:xfrm>
+          <a:prstGeom prst="rightArrow">
+            <a:avLst/>
           </a:prstGeom>
           <a:solidFill>
             <a:schemeClr val="tx1"/>
@@ -8386,20 +9355,16 @@
           <a:lstStyle/>
           <a:p>
             <a:pPr algn="ctr"/>
-            <a:endParaRPr lang="en-US" dirty="0">
-              <a:solidFill>
-                <a:schemeClr val="tx1"/>
-              </a:solidFill>
-            </a:endParaRPr>
-          </a:p>
-        </p:txBody>
-      </p:sp>
-      <p:sp>
-        <p:nvSpPr>
-          <p:cNvPr id="12" name="Flecha: a la derecha 11">
-            <a:extLst>
-              <a:ext uri="{FF2B5EF4-FFF2-40B4-BE49-F238E27FC236}">
-                <a16:creationId xmlns:a16="http://schemas.microsoft.com/office/drawing/2014/main" id="{ED6B3157-2252-4436-B4C3-642D28F357F5}"/>
+            <a:endParaRPr lang="en-US"/>
+          </a:p>
+        </p:txBody>
+      </p:sp>
+      <p:sp>
+        <p:nvSpPr>
+          <p:cNvPr id="14" name="Flecha: a la derecha 13">
+            <a:extLst>
+              <a:ext uri="{FF2B5EF4-FFF2-40B4-BE49-F238E27FC236}">
+                <a16:creationId xmlns:a16="http://schemas.microsoft.com/office/drawing/2014/main" id="{2161B8B6-E1CA-45A8-9BF9-8482AF94CD62}"/>
               </a:ext>
             </a:extLst>
           </p:cNvPr>
@@ -8407,9 +9372,9 @@
           <p:nvPr/>
         </p:nvSpPr>
         <p:spPr>
-          <a:xfrm rot="2432043">
-            <a:off x="7973741" y="4905537"/>
-            <a:ext cx="1066477" cy="249608"/>
+          <a:xfrm rot="1177608">
+            <a:off x="7949890" y="5250932"/>
+            <a:ext cx="898536" cy="249608"/>
           </a:xfrm>
           <a:prstGeom prst="rightArrow">
             <a:avLst/>
@@ -8452,315 +9417,6 @@
     <p:extLst>
       <p:ext uri="{BB962C8B-B14F-4D97-AF65-F5344CB8AC3E}">
         <p14:creationId xmlns:p14="http://schemas.microsoft.com/office/powerpoint/2010/main" val="2240758136"/>
-      </p:ext>
-    </p:extLst>
-  </p:cSld>
-  <p:clrMapOvr>
-    <a:masterClrMapping/>
-  </p:clrMapOvr>
-</p:sld>
-</file>
-
-<file path=ppt/slides/slide18.xml><?xml version="1.0" encoding="utf-8"?>
-<p:sld xmlns:a="http://schemas.openxmlformats.org/drawingml/2006/main" xmlns:r="http://schemas.openxmlformats.org/officeDocument/2006/relationships" xmlns:p="http://schemas.openxmlformats.org/presentationml/2006/main">
-  <p:cSld>
-    <p:spTree>
-      <p:nvGrpSpPr>
-        <p:cNvPr id="1" name=""/>
-        <p:cNvGrpSpPr/>
-        <p:nvPr/>
-      </p:nvGrpSpPr>
-      <p:grpSpPr>
-        <a:xfrm>
-          <a:off x="0" y="0"/>
-          <a:ext cx="0" cy="0"/>
-          <a:chOff x="0" y="0"/>
-          <a:chExt cx="0" cy="0"/>
-        </a:xfrm>
-      </p:grpSpPr>
-      <p:sp>
-        <p:nvSpPr>
-          <p:cNvPr id="4" name="Rectángulo 3">
-            <a:extLst>
-              <a:ext uri="{FF2B5EF4-FFF2-40B4-BE49-F238E27FC236}">
-                <a16:creationId xmlns:a16="http://schemas.microsoft.com/office/drawing/2014/main" id="{6CD4C87E-B221-45CE-93DC-BD05927016DF}"/>
-              </a:ext>
-            </a:extLst>
-          </p:cNvPr>
-          <p:cNvSpPr/>
-          <p:nvPr/>
-        </p:nvSpPr>
-        <p:spPr>
-          <a:xfrm>
-            <a:off x="0" y="1371600"/>
-            <a:ext cx="12192000" cy="5486400"/>
-          </a:xfrm>
-          <a:prstGeom prst="rect">
-            <a:avLst/>
-          </a:prstGeom>
-          <a:solidFill>
-            <a:schemeClr val="bg1"/>
-          </a:solidFill>
-          <a:ln>
-            <a:solidFill>
-              <a:schemeClr val="bg1"/>
-            </a:solidFill>
-          </a:ln>
-        </p:spPr>
-        <p:style>
-          <a:lnRef idx="2">
-            <a:schemeClr val="accent1">
-              <a:shade val="50000"/>
-            </a:schemeClr>
-          </a:lnRef>
-          <a:fillRef idx="1">
-            <a:schemeClr val="accent1"/>
-          </a:fillRef>
-          <a:effectRef idx="0">
-            <a:schemeClr val="accent1"/>
-          </a:effectRef>
-          <a:fontRef idx="minor">
-            <a:schemeClr val="lt1"/>
-          </a:fontRef>
-        </p:style>
-        <p:txBody>
-          <a:bodyPr rtlCol="0" anchor="ctr"/>
-          <a:lstStyle/>
-          <a:p>
-            <a:pPr algn="ctr"/>
-            <a:endParaRPr lang="en-US" dirty="0"/>
-          </a:p>
-        </p:txBody>
-      </p:sp>
-      <p:pic>
-        <p:nvPicPr>
-          <p:cNvPr id="5" name="Picture 12" descr="Resultado de imagen de tinamica smartdata">
-            <a:extLst>
-              <a:ext uri="{FF2B5EF4-FFF2-40B4-BE49-F238E27FC236}">
-                <a16:creationId xmlns:a16="http://schemas.microsoft.com/office/drawing/2014/main" id="{31F64E77-1B5E-4538-9E84-2AC91F796445}"/>
-              </a:ext>
-            </a:extLst>
-          </p:cNvPr>
-          <p:cNvPicPr>
-            <a:picLocks noChangeAspect="1" noChangeArrowheads="1"/>
-          </p:cNvPicPr>
-          <p:nvPr/>
-        </p:nvPicPr>
-        <p:blipFill>
-          <a:blip r:embed="rId2">
-            <a:extLst>
-              <a:ext uri="{28A0092B-C50C-407E-A947-70E740481C1C}">
-                <a14:useLocalDpi xmlns:a14="http://schemas.microsoft.com/office/drawing/2010/main" val="0"/>
-              </a:ext>
-            </a:extLst>
-          </a:blip>
-          <a:srcRect/>
-          <a:stretch>
-            <a:fillRect/>
-          </a:stretch>
-        </p:blipFill>
-        <p:spPr bwMode="auto">
-          <a:xfrm>
-            <a:off x="4680628" y="3058230"/>
-            <a:ext cx="2830743" cy="741539"/>
-          </a:xfrm>
-          <a:prstGeom prst="rect">
-            <a:avLst/>
-          </a:prstGeom>
-          <a:noFill/>
-          <a:extLst>
-            <a:ext uri="{909E8E84-426E-40DD-AFC4-6F175D3DCCD1}">
-              <a14:hiddenFill xmlns:a14="http://schemas.microsoft.com/office/drawing/2010/main">
-                <a:solidFill>
-                  <a:srgbClr val="FFFFFF"/>
-                </a:solidFill>
-              </a14:hiddenFill>
-            </a:ext>
-          </a:extLst>
-        </p:spPr>
-      </p:pic>
-      <p:sp>
-        <p:nvSpPr>
-          <p:cNvPr id="6" name="Triángulo isósceles 5">
-            <a:extLst>
-              <a:ext uri="{FF2B5EF4-FFF2-40B4-BE49-F238E27FC236}">
-                <a16:creationId xmlns:a16="http://schemas.microsoft.com/office/drawing/2014/main" id="{0AC0C27F-AB2A-4BF4-9C28-F1C0DD84E3BF}"/>
-              </a:ext>
-            </a:extLst>
-          </p:cNvPr>
-          <p:cNvSpPr/>
-          <p:nvPr/>
-        </p:nvSpPr>
-        <p:spPr>
-          <a:xfrm flipV="1">
-            <a:off x="0" y="-3"/>
-            <a:ext cx="12113703" cy="681040"/>
-          </a:xfrm>
-          <a:prstGeom prst="triangle">
-            <a:avLst>
-              <a:gd name="adj" fmla="val 0"/>
-            </a:avLst>
-          </a:prstGeom>
-          <a:solidFill>
-            <a:schemeClr val="bg2">
-              <a:lumMod val="90000"/>
-            </a:schemeClr>
-          </a:solidFill>
-          <a:ln>
-            <a:noFill/>
-          </a:ln>
-        </p:spPr>
-        <p:style>
-          <a:lnRef idx="2">
-            <a:schemeClr val="accent1">
-              <a:shade val="50000"/>
-            </a:schemeClr>
-          </a:lnRef>
-          <a:fillRef idx="1">
-            <a:schemeClr val="accent1"/>
-          </a:fillRef>
-          <a:effectRef idx="0">
-            <a:schemeClr val="accent1"/>
-          </a:effectRef>
-          <a:fontRef idx="minor">
-            <a:schemeClr val="lt1"/>
-          </a:fontRef>
-        </p:style>
-        <p:txBody>
-          <a:bodyPr rot="0" spcFirstLastPara="0" vertOverflow="overflow" horzOverflow="overflow" vert="horz" wrap="square" lIns="91440" tIns="45720" rIns="91440" bIns="45720" numCol="1" spcCol="0" rtlCol="0" fromWordArt="0" anchor="ctr" anchorCtr="0" forceAA="0" compatLnSpc="1">
-            <a:prstTxWarp prst="textNoShape">
-              <a:avLst/>
-            </a:prstTxWarp>
-            <a:noAutofit/>
-          </a:bodyPr>
-          <a:lstStyle/>
-          <a:p>
-            <a:pPr algn="ctr"/>
-            <a:endParaRPr lang="en-US" dirty="0"/>
-          </a:p>
-        </p:txBody>
-      </p:sp>
-      <p:sp>
-        <p:nvSpPr>
-          <p:cNvPr id="7" name="Triángulo isósceles 6">
-            <a:extLst>
-              <a:ext uri="{FF2B5EF4-FFF2-40B4-BE49-F238E27FC236}">
-                <a16:creationId xmlns:a16="http://schemas.microsoft.com/office/drawing/2014/main" id="{A2BB0CA5-E4F3-40CA-9E10-D270C343C5E0}"/>
-              </a:ext>
-            </a:extLst>
-          </p:cNvPr>
-          <p:cNvSpPr/>
-          <p:nvPr/>
-        </p:nvSpPr>
-        <p:spPr>
-          <a:xfrm flipV="1">
-            <a:off x="0" y="0"/>
-            <a:ext cx="8931564" cy="1128338"/>
-          </a:xfrm>
-          <a:prstGeom prst="triangle">
-            <a:avLst>
-              <a:gd name="adj" fmla="val 0"/>
-            </a:avLst>
-          </a:prstGeom>
-          <a:solidFill>
-            <a:srgbClr val="C00000"/>
-          </a:solidFill>
-          <a:ln>
-            <a:noFill/>
-          </a:ln>
-        </p:spPr>
-        <p:style>
-          <a:lnRef idx="2">
-            <a:schemeClr val="accent1">
-              <a:shade val="50000"/>
-            </a:schemeClr>
-          </a:lnRef>
-          <a:fillRef idx="1">
-            <a:schemeClr val="accent1"/>
-          </a:fillRef>
-          <a:effectRef idx="0">
-            <a:schemeClr val="accent1"/>
-          </a:effectRef>
-          <a:fontRef idx="minor">
-            <a:schemeClr val="lt1"/>
-          </a:fontRef>
-        </p:style>
-        <p:txBody>
-          <a:bodyPr rot="0" spcFirstLastPara="0" vertOverflow="overflow" horzOverflow="overflow" vert="horz" wrap="square" lIns="91440" tIns="45720" rIns="91440" bIns="45720" numCol="1" spcCol="0" rtlCol="0" fromWordArt="0" anchor="ctr" anchorCtr="0" forceAA="0" compatLnSpc="1">
-            <a:prstTxWarp prst="textNoShape">
-              <a:avLst/>
-            </a:prstTxWarp>
-            <a:noAutofit/>
-          </a:bodyPr>
-          <a:lstStyle/>
-          <a:p>
-            <a:pPr algn="ctr"/>
-            <a:endParaRPr lang="en-US" dirty="0">
-              <a:latin typeface="Century Gothic" panose="020B0502020202020204" pitchFamily="34" charset="0"/>
-            </a:endParaRPr>
-          </a:p>
-        </p:txBody>
-      </p:sp>
-      <p:sp>
-        <p:nvSpPr>
-          <p:cNvPr id="8" name="Triángulo isósceles 7">
-            <a:extLst>
-              <a:ext uri="{FF2B5EF4-FFF2-40B4-BE49-F238E27FC236}">
-                <a16:creationId xmlns:a16="http://schemas.microsoft.com/office/drawing/2014/main" id="{BEFEAB9D-1D48-4130-B2EC-8FFB7DD59D03}"/>
-              </a:ext>
-            </a:extLst>
-          </p:cNvPr>
-          <p:cNvSpPr/>
-          <p:nvPr/>
-        </p:nvSpPr>
-        <p:spPr>
-          <a:xfrm flipV="1">
-            <a:off x="0" y="-1"/>
-            <a:ext cx="7340367" cy="1128340"/>
-          </a:xfrm>
-          <a:prstGeom prst="triangle">
-            <a:avLst>
-              <a:gd name="adj" fmla="val 0"/>
-            </a:avLst>
-          </a:prstGeom>
-          <a:solidFill>
-            <a:srgbClr val="002060"/>
-          </a:solidFill>
-          <a:ln>
-            <a:noFill/>
-          </a:ln>
-        </p:spPr>
-        <p:style>
-          <a:lnRef idx="2">
-            <a:schemeClr val="accent1">
-              <a:shade val="50000"/>
-            </a:schemeClr>
-          </a:lnRef>
-          <a:fillRef idx="1">
-            <a:schemeClr val="accent1"/>
-          </a:fillRef>
-          <a:effectRef idx="0">
-            <a:schemeClr val="accent1"/>
-          </a:effectRef>
-          <a:fontRef idx="minor">
-            <a:schemeClr val="lt1"/>
-          </a:fontRef>
-        </p:style>
-        <p:txBody>
-          <a:bodyPr rtlCol="0" anchor="ctr"/>
-          <a:lstStyle/>
-          <a:p>
-            <a:pPr algn="ctr"/>
-            <a:endParaRPr lang="en-US" dirty="0">
-              <a:latin typeface="Century Gothic" panose="020B0502020202020204" pitchFamily="34" charset="0"/>
-            </a:endParaRPr>
-          </a:p>
-        </p:txBody>
-      </p:sp>
-    </p:spTree>
-    <p:extLst>
-      <p:ext uri="{BB962C8B-B14F-4D97-AF65-F5344CB8AC3E}">
-        <p14:creationId xmlns:p14="http://schemas.microsoft.com/office/powerpoint/2010/main" val="2703144559"/>
       </p:ext>
     </p:extLst>
   </p:cSld>
@@ -9138,6 +9794,315 @@
 </p:sld>
 </file>
 
+<file path=ppt/slides/slide20.xml><?xml version="1.0" encoding="utf-8"?>
+<p:sld xmlns:a="http://schemas.openxmlformats.org/drawingml/2006/main" xmlns:r="http://schemas.openxmlformats.org/officeDocument/2006/relationships" xmlns:p="http://schemas.openxmlformats.org/presentationml/2006/main">
+  <p:cSld>
+    <p:spTree>
+      <p:nvGrpSpPr>
+        <p:cNvPr id="1" name=""/>
+        <p:cNvGrpSpPr/>
+        <p:nvPr/>
+      </p:nvGrpSpPr>
+      <p:grpSpPr>
+        <a:xfrm>
+          <a:off x="0" y="0"/>
+          <a:ext cx="0" cy="0"/>
+          <a:chOff x="0" y="0"/>
+          <a:chExt cx="0" cy="0"/>
+        </a:xfrm>
+      </p:grpSpPr>
+      <p:sp>
+        <p:nvSpPr>
+          <p:cNvPr id="4" name="Rectángulo 3">
+            <a:extLst>
+              <a:ext uri="{FF2B5EF4-FFF2-40B4-BE49-F238E27FC236}">
+                <a16:creationId xmlns:a16="http://schemas.microsoft.com/office/drawing/2014/main" id="{6CD4C87E-B221-45CE-93DC-BD05927016DF}"/>
+              </a:ext>
+            </a:extLst>
+          </p:cNvPr>
+          <p:cNvSpPr/>
+          <p:nvPr/>
+        </p:nvSpPr>
+        <p:spPr>
+          <a:xfrm>
+            <a:off x="0" y="1371600"/>
+            <a:ext cx="12192000" cy="5486400"/>
+          </a:xfrm>
+          <a:prstGeom prst="rect">
+            <a:avLst/>
+          </a:prstGeom>
+          <a:solidFill>
+            <a:schemeClr val="bg1"/>
+          </a:solidFill>
+          <a:ln>
+            <a:solidFill>
+              <a:schemeClr val="bg1"/>
+            </a:solidFill>
+          </a:ln>
+        </p:spPr>
+        <p:style>
+          <a:lnRef idx="2">
+            <a:schemeClr val="accent1">
+              <a:shade val="50000"/>
+            </a:schemeClr>
+          </a:lnRef>
+          <a:fillRef idx="1">
+            <a:schemeClr val="accent1"/>
+          </a:fillRef>
+          <a:effectRef idx="0">
+            <a:schemeClr val="accent1"/>
+          </a:effectRef>
+          <a:fontRef idx="minor">
+            <a:schemeClr val="lt1"/>
+          </a:fontRef>
+        </p:style>
+        <p:txBody>
+          <a:bodyPr rtlCol="0" anchor="ctr"/>
+          <a:lstStyle/>
+          <a:p>
+            <a:pPr algn="ctr"/>
+            <a:endParaRPr lang="en-US" dirty="0"/>
+          </a:p>
+        </p:txBody>
+      </p:sp>
+      <p:pic>
+        <p:nvPicPr>
+          <p:cNvPr id="5" name="Picture 12" descr="Resultado de imagen de tinamica smartdata">
+            <a:extLst>
+              <a:ext uri="{FF2B5EF4-FFF2-40B4-BE49-F238E27FC236}">
+                <a16:creationId xmlns:a16="http://schemas.microsoft.com/office/drawing/2014/main" id="{31F64E77-1B5E-4538-9E84-2AC91F796445}"/>
+              </a:ext>
+            </a:extLst>
+          </p:cNvPr>
+          <p:cNvPicPr>
+            <a:picLocks noChangeAspect="1" noChangeArrowheads="1"/>
+          </p:cNvPicPr>
+          <p:nvPr/>
+        </p:nvPicPr>
+        <p:blipFill>
+          <a:blip r:embed="rId2">
+            <a:extLst>
+              <a:ext uri="{28A0092B-C50C-407E-A947-70E740481C1C}">
+                <a14:useLocalDpi xmlns:a14="http://schemas.microsoft.com/office/drawing/2010/main" val="0"/>
+              </a:ext>
+            </a:extLst>
+          </a:blip>
+          <a:srcRect/>
+          <a:stretch>
+            <a:fillRect/>
+          </a:stretch>
+        </p:blipFill>
+        <p:spPr bwMode="auto">
+          <a:xfrm>
+            <a:off x="4680628" y="3058230"/>
+            <a:ext cx="2830743" cy="741539"/>
+          </a:xfrm>
+          <a:prstGeom prst="rect">
+            <a:avLst/>
+          </a:prstGeom>
+          <a:noFill/>
+          <a:extLst>
+            <a:ext uri="{909E8E84-426E-40DD-AFC4-6F175D3DCCD1}">
+              <a14:hiddenFill xmlns:a14="http://schemas.microsoft.com/office/drawing/2010/main">
+                <a:solidFill>
+                  <a:srgbClr val="FFFFFF"/>
+                </a:solidFill>
+              </a14:hiddenFill>
+            </a:ext>
+          </a:extLst>
+        </p:spPr>
+      </p:pic>
+      <p:sp>
+        <p:nvSpPr>
+          <p:cNvPr id="6" name="Triángulo isósceles 5">
+            <a:extLst>
+              <a:ext uri="{FF2B5EF4-FFF2-40B4-BE49-F238E27FC236}">
+                <a16:creationId xmlns:a16="http://schemas.microsoft.com/office/drawing/2014/main" id="{0AC0C27F-AB2A-4BF4-9C28-F1C0DD84E3BF}"/>
+              </a:ext>
+            </a:extLst>
+          </p:cNvPr>
+          <p:cNvSpPr/>
+          <p:nvPr/>
+        </p:nvSpPr>
+        <p:spPr>
+          <a:xfrm flipV="1">
+            <a:off x="0" y="-3"/>
+            <a:ext cx="12113703" cy="681040"/>
+          </a:xfrm>
+          <a:prstGeom prst="triangle">
+            <a:avLst>
+              <a:gd name="adj" fmla="val 0"/>
+            </a:avLst>
+          </a:prstGeom>
+          <a:solidFill>
+            <a:schemeClr val="bg2">
+              <a:lumMod val="90000"/>
+            </a:schemeClr>
+          </a:solidFill>
+          <a:ln>
+            <a:noFill/>
+          </a:ln>
+        </p:spPr>
+        <p:style>
+          <a:lnRef idx="2">
+            <a:schemeClr val="accent1">
+              <a:shade val="50000"/>
+            </a:schemeClr>
+          </a:lnRef>
+          <a:fillRef idx="1">
+            <a:schemeClr val="accent1"/>
+          </a:fillRef>
+          <a:effectRef idx="0">
+            <a:schemeClr val="accent1"/>
+          </a:effectRef>
+          <a:fontRef idx="minor">
+            <a:schemeClr val="lt1"/>
+          </a:fontRef>
+        </p:style>
+        <p:txBody>
+          <a:bodyPr rot="0" spcFirstLastPara="0" vertOverflow="overflow" horzOverflow="overflow" vert="horz" wrap="square" lIns="91440" tIns="45720" rIns="91440" bIns="45720" numCol="1" spcCol="0" rtlCol="0" fromWordArt="0" anchor="ctr" anchorCtr="0" forceAA="0" compatLnSpc="1">
+            <a:prstTxWarp prst="textNoShape">
+              <a:avLst/>
+            </a:prstTxWarp>
+            <a:noAutofit/>
+          </a:bodyPr>
+          <a:lstStyle/>
+          <a:p>
+            <a:pPr algn="ctr"/>
+            <a:endParaRPr lang="en-US" dirty="0"/>
+          </a:p>
+        </p:txBody>
+      </p:sp>
+      <p:sp>
+        <p:nvSpPr>
+          <p:cNvPr id="7" name="Triángulo isósceles 6">
+            <a:extLst>
+              <a:ext uri="{FF2B5EF4-FFF2-40B4-BE49-F238E27FC236}">
+                <a16:creationId xmlns:a16="http://schemas.microsoft.com/office/drawing/2014/main" id="{A2BB0CA5-E4F3-40CA-9E10-D270C343C5E0}"/>
+              </a:ext>
+            </a:extLst>
+          </p:cNvPr>
+          <p:cNvSpPr/>
+          <p:nvPr/>
+        </p:nvSpPr>
+        <p:spPr>
+          <a:xfrm flipV="1">
+            <a:off x="0" y="0"/>
+            <a:ext cx="8931564" cy="1128338"/>
+          </a:xfrm>
+          <a:prstGeom prst="triangle">
+            <a:avLst>
+              <a:gd name="adj" fmla="val 0"/>
+            </a:avLst>
+          </a:prstGeom>
+          <a:solidFill>
+            <a:srgbClr val="C00000"/>
+          </a:solidFill>
+          <a:ln>
+            <a:noFill/>
+          </a:ln>
+        </p:spPr>
+        <p:style>
+          <a:lnRef idx="2">
+            <a:schemeClr val="accent1">
+              <a:shade val="50000"/>
+            </a:schemeClr>
+          </a:lnRef>
+          <a:fillRef idx="1">
+            <a:schemeClr val="accent1"/>
+          </a:fillRef>
+          <a:effectRef idx="0">
+            <a:schemeClr val="accent1"/>
+          </a:effectRef>
+          <a:fontRef idx="minor">
+            <a:schemeClr val="lt1"/>
+          </a:fontRef>
+        </p:style>
+        <p:txBody>
+          <a:bodyPr rot="0" spcFirstLastPara="0" vertOverflow="overflow" horzOverflow="overflow" vert="horz" wrap="square" lIns="91440" tIns="45720" rIns="91440" bIns="45720" numCol="1" spcCol="0" rtlCol="0" fromWordArt="0" anchor="ctr" anchorCtr="0" forceAA="0" compatLnSpc="1">
+            <a:prstTxWarp prst="textNoShape">
+              <a:avLst/>
+            </a:prstTxWarp>
+            <a:noAutofit/>
+          </a:bodyPr>
+          <a:lstStyle/>
+          <a:p>
+            <a:pPr algn="ctr"/>
+            <a:endParaRPr lang="en-US" dirty="0">
+              <a:latin typeface="Century Gothic" panose="020B0502020202020204" pitchFamily="34" charset="0"/>
+            </a:endParaRPr>
+          </a:p>
+        </p:txBody>
+      </p:sp>
+      <p:sp>
+        <p:nvSpPr>
+          <p:cNvPr id="8" name="Triángulo isósceles 7">
+            <a:extLst>
+              <a:ext uri="{FF2B5EF4-FFF2-40B4-BE49-F238E27FC236}">
+                <a16:creationId xmlns:a16="http://schemas.microsoft.com/office/drawing/2014/main" id="{BEFEAB9D-1D48-4130-B2EC-8FFB7DD59D03}"/>
+              </a:ext>
+            </a:extLst>
+          </p:cNvPr>
+          <p:cNvSpPr/>
+          <p:nvPr/>
+        </p:nvSpPr>
+        <p:spPr>
+          <a:xfrm flipV="1">
+            <a:off x="0" y="-1"/>
+            <a:ext cx="7340367" cy="1128340"/>
+          </a:xfrm>
+          <a:prstGeom prst="triangle">
+            <a:avLst>
+              <a:gd name="adj" fmla="val 0"/>
+            </a:avLst>
+          </a:prstGeom>
+          <a:solidFill>
+            <a:srgbClr val="002060"/>
+          </a:solidFill>
+          <a:ln>
+            <a:noFill/>
+          </a:ln>
+        </p:spPr>
+        <p:style>
+          <a:lnRef idx="2">
+            <a:schemeClr val="accent1">
+              <a:shade val="50000"/>
+            </a:schemeClr>
+          </a:lnRef>
+          <a:fillRef idx="1">
+            <a:schemeClr val="accent1"/>
+          </a:fillRef>
+          <a:effectRef idx="0">
+            <a:schemeClr val="accent1"/>
+          </a:effectRef>
+          <a:fontRef idx="minor">
+            <a:schemeClr val="lt1"/>
+          </a:fontRef>
+        </p:style>
+        <p:txBody>
+          <a:bodyPr rtlCol="0" anchor="ctr"/>
+          <a:lstStyle/>
+          <a:p>
+            <a:pPr algn="ctr"/>
+            <a:endParaRPr lang="en-US" dirty="0">
+              <a:latin typeface="Century Gothic" panose="020B0502020202020204" pitchFamily="34" charset="0"/>
+            </a:endParaRPr>
+          </a:p>
+        </p:txBody>
+      </p:sp>
+    </p:spTree>
+    <p:extLst>
+      <p:ext uri="{BB962C8B-B14F-4D97-AF65-F5344CB8AC3E}">
+        <p14:creationId xmlns:p14="http://schemas.microsoft.com/office/powerpoint/2010/main" val="2703144559"/>
+      </p:ext>
+    </p:extLst>
+  </p:cSld>
+  <p:clrMapOvr>
+    <a:masterClrMapping/>
+  </p:clrMapOvr>
+</p:sld>
+</file>
+
 <file path=ppt/slides/slide3.xml><?xml version="1.0" encoding="utf-8"?>
 <p:sld xmlns:a="http://schemas.openxmlformats.org/drawingml/2006/main" xmlns:r="http://schemas.openxmlformats.org/officeDocument/2006/relationships" xmlns:p="http://schemas.openxmlformats.org/presentationml/2006/main">
   <p:cSld>
@@ -9388,7 +10353,7 @@
         <p:spPr>
           <a:xfrm>
             <a:off x="5744846" y="1690970"/>
-            <a:ext cx="5834325" cy="1877437"/>
+            <a:ext cx="5834325" cy="2308324"/>
           </a:xfrm>
           <a:prstGeom prst="rect">
             <a:avLst/>
@@ -9467,122 +10432,16 @@
             </a:pPr>
             <a:r>
               <a:rPr lang="en-US" sz="1400" dirty="0"/>
-              <a:t>Creación de variables step, impulso y lidiar con outliers</a:t>
-            </a:r>
-          </a:p>
-        </p:txBody>
-      </p:sp>
-      <p:sp>
-        <p:nvSpPr>
-          <p:cNvPr id="43" name="CuadroTexto 42">
-            <a:extLst>
-              <a:ext uri="{FF2B5EF4-FFF2-40B4-BE49-F238E27FC236}">
-                <a16:creationId xmlns:a16="http://schemas.microsoft.com/office/drawing/2014/main" id="{47A5A277-2DCF-4F78-A2A7-6F76ED500228}"/>
-              </a:ext>
-            </a:extLst>
-          </p:cNvPr>
-          <p:cNvSpPr txBox="1"/>
-          <p:nvPr/>
-        </p:nvSpPr>
-        <p:spPr>
-          <a:xfrm>
-            <a:off x="-85506" y="1360657"/>
-            <a:ext cx="3959603" cy="400110"/>
-          </a:xfrm>
-          <a:prstGeom prst="rect">
-            <a:avLst/>
-          </a:prstGeom>
-          <a:noFill/>
-        </p:spPr>
-        <p:txBody>
-          <a:bodyPr wrap="square" rtlCol="0">
-            <a:spAutoFit/>
-          </a:bodyPr>
-          <a:lstStyle/>
-          <a:p>
-            <a:pPr algn="ctr"/>
-            <a:r>
-              <a:rPr lang="es-ES" sz="2000" i="1" dirty="0"/>
-              <a:t>Primera Fase – 2 Semanas</a:t>
-            </a:r>
-            <a:endParaRPr lang="en-US" i="1" dirty="0"/>
-          </a:p>
-        </p:txBody>
-      </p:sp>
-      <p:sp>
-        <p:nvSpPr>
-          <p:cNvPr id="45" name="CuadroTexto 44">
-            <a:extLst>
-              <a:ext uri="{FF2B5EF4-FFF2-40B4-BE49-F238E27FC236}">
-                <a16:creationId xmlns:a16="http://schemas.microsoft.com/office/drawing/2014/main" id="{12170AA0-17D0-458A-8380-F90F34FCB72B}"/>
-              </a:ext>
-            </a:extLst>
-          </p:cNvPr>
-          <p:cNvSpPr txBox="1"/>
-          <p:nvPr/>
-        </p:nvSpPr>
-        <p:spPr>
-          <a:xfrm>
-            <a:off x="5553080" y="1360657"/>
-            <a:ext cx="3643618" cy="400110"/>
-          </a:xfrm>
-          <a:prstGeom prst="rect">
-            <a:avLst/>
-          </a:prstGeom>
-          <a:noFill/>
-        </p:spPr>
-        <p:txBody>
-          <a:bodyPr wrap="square" rtlCol="0">
-            <a:spAutoFit/>
-          </a:bodyPr>
-          <a:lstStyle/>
-          <a:p>
-            <a:pPr algn="ctr"/>
-            <a:r>
-              <a:rPr lang="es-ES" sz="2000" i="1" dirty="0"/>
-              <a:t>Segunda Fase </a:t>
-            </a:r>
-            <a:r>
-              <a:rPr lang="es-ES" sz="1800" i="1" dirty="0"/>
-              <a:t>– 2 Semanas</a:t>
-            </a:r>
-            <a:endParaRPr lang="en-US" i="1" dirty="0"/>
-          </a:p>
-        </p:txBody>
-      </p:sp>
-      <p:sp>
-        <p:nvSpPr>
-          <p:cNvPr id="8" name="CuadroTexto 7">
-            <a:extLst>
-              <a:ext uri="{FF2B5EF4-FFF2-40B4-BE49-F238E27FC236}">
-                <a16:creationId xmlns:a16="http://schemas.microsoft.com/office/drawing/2014/main" id="{152C8A77-647A-4001-81B8-157BAF9D71D0}"/>
-              </a:ext>
-            </a:extLst>
-          </p:cNvPr>
-          <p:cNvSpPr txBox="1"/>
-          <p:nvPr/>
-        </p:nvSpPr>
-        <p:spPr>
-          <a:xfrm>
-            <a:off x="5708495" y="4346741"/>
-            <a:ext cx="5834325" cy="2092881"/>
-          </a:xfrm>
-          <a:prstGeom prst="rect">
-            <a:avLst/>
-          </a:prstGeom>
-          <a:noFill/>
-        </p:spPr>
-        <p:txBody>
-          <a:bodyPr wrap="square" rtlCol="0">
-            <a:spAutoFit/>
-          </a:bodyPr>
-          <a:lstStyle/>
-          <a:p>
-            <a:r>
-              <a:rPr lang="es-ES" b="1" dirty="0"/>
-              <a:t>Modelos Avanzados</a:t>
-            </a:r>
-            <a:endParaRPr lang="en-US" b="1" dirty="0"/>
+              <a:t>Creación de variables </a:t>
+            </a:r>
+            <a:r>
+              <a:rPr lang="en-US" sz="1400" dirty="0" err="1"/>
+              <a:t>regresoras</a:t>
+            </a:r>
+            <a:r>
+              <a:rPr lang="en-US" sz="1400" dirty="0"/>
+              <a:t>, step e impulse</a:t>
+            </a:r>
           </a:p>
           <a:p>
             <a:pPr marL="742950" lvl="1" indent="-285750">
@@ -9590,9 +10449,18 @@
               <a:buChar char="Ø"/>
             </a:pPr>
             <a:r>
+              <a:rPr lang="en-US" sz="1400" dirty="0" err="1"/>
+              <a:t>Aplicabilidad</a:t>
+            </a:r>
+            <a:r>
               <a:rPr lang="en-US" sz="1400" dirty="0"/>
-              <a:t>Modelado de Series Temporales con Redes Neuronales</a:t>
-            </a:r>
+              <a:t> de </a:t>
+            </a:r>
+            <a:r>
+              <a:rPr lang="en-US" sz="1400" dirty="0" err="1"/>
+              <a:t>modelos</a:t>
+            </a:r>
+            <a:endParaRPr lang="en-US" sz="1400" dirty="0"/>
           </a:p>
           <a:p>
             <a:pPr marL="1200150" lvl="2" indent="-285750">
@@ -9600,9 +10468,139 @@
               <a:buChar char="Ø"/>
             </a:pPr>
             <a:r>
+              <a:rPr lang="en-US" sz="1400" dirty="0" err="1"/>
+              <a:t>Teoría</a:t>
+            </a:r>
+            <a:r>
               <a:rPr lang="en-US" sz="1400" dirty="0"/>
-              <a:t>LSTM</a:t>
-            </a:r>
+              <a:t> de los mercados </a:t>
+            </a:r>
+            <a:r>
+              <a:rPr lang="en-US" sz="1400" dirty="0" err="1"/>
+              <a:t>eficientes</a:t>
+            </a:r>
+            <a:endParaRPr lang="en-US" sz="1400" dirty="0"/>
+          </a:p>
+          <a:p>
+            <a:pPr marL="1200150" lvl="2" indent="-285750">
+              <a:buFont typeface="Wingdings" panose="05000000000000000000" pitchFamily="2" charset="2"/>
+              <a:buChar char="Ø"/>
+            </a:pPr>
+            <a:endParaRPr lang="en-US" sz="1400" dirty="0"/>
+          </a:p>
+        </p:txBody>
+      </p:sp>
+      <p:sp>
+        <p:nvSpPr>
+          <p:cNvPr id="43" name="CuadroTexto 42">
+            <a:extLst>
+              <a:ext uri="{FF2B5EF4-FFF2-40B4-BE49-F238E27FC236}">
+                <a16:creationId xmlns:a16="http://schemas.microsoft.com/office/drawing/2014/main" id="{47A5A277-2DCF-4F78-A2A7-6F76ED500228}"/>
+              </a:ext>
+            </a:extLst>
+          </p:cNvPr>
+          <p:cNvSpPr txBox="1"/>
+          <p:nvPr/>
+        </p:nvSpPr>
+        <p:spPr>
+          <a:xfrm>
+            <a:off x="-85506" y="1360657"/>
+            <a:ext cx="3959603" cy="400110"/>
+          </a:xfrm>
+          <a:prstGeom prst="rect">
+            <a:avLst/>
+          </a:prstGeom>
+          <a:noFill/>
+        </p:spPr>
+        <p:txBody>
+          <a:bodyPr wrap="square" rtlCol="0">
+            <a:spAutoFit/>
+          </a:bodyPr>
+          <a:lstStyle/>
+          <a:p>
+            <a:pPr algn="ctr"/>
+            <a:r>
+              <a:rPr lang="es-ES" sz="2000" i="1" dirty="0"/>
+              <a:t>Primera Fase – 2 Semanas</a:t>
+            </a:r>
+            <a:endParaRPr lang="en-US" i="1" dirty="0"/>
+          </a:p>
+        </p:txBody>
+      </p:sp>
+      <p:sp>
+        <p:nvSpPr>
+          <p:cNvPr id="45" name="CuadroTexto 44">
+            <a:extLst>
+              <a:ext uri="{FF2B5EF4-FFF2-40B4-BE49-F238E27FC236}">
+                <a16:creationId xmlns:a16="http://schemas.microsoft.com/office/drawing/2014/main" id="{12170AA0-17D0-458A-8380-F90F34FCB72B}"/>
+              </a:ext>
+            </a:extLst>
+          </p:cNvPr>
+          <p:cNvSpPr txBox="1"/>
+          <p:nvPr/>
+        </p:nvSpPr>
+        <p:spPr>
+          <a:xfrm>
+            <a:off x="5553080" y="1360657"/>
+            <a:ext cx="3643618" cy="400110"/>
+          </a:xfrm>
+          <a:prstGeom prst="rect">
+            <a:avLst/>
+          </a:prstGeom>
+          <a:noFill/>
+        </p:spPr>
+        <p:txBody>
+          <a:bodyPr wrap="square" rtlCol="0">
+            <a:spAutoFit/>
+          </a:bodyPr>
+          <a:lstStyle/>
+          <a:p>
+            <a:pPr algn="ctr"/>
+            <a:r>
+              <a:rPr lang="es-ES" sz="2000" i="1" dirty="0"/>
+              <a:t>Segunda Fase </a:t>
+            </a:r>
+            <a:r>
+              <a:rPr lang="es-ES" sz="1800" i="1" dirty="0"/>
+              <a:t>– 2 Semanas</a:t>
+            </a:r>
+            <a:endParaRPr lang="en-US" i="1" dirty="0"/>
+          </a:p>
+        </p:txBody>
+      </p:sp>
+      <p:sp>
+        <p:nvSpPr>
+          <p:cNvPr id="8" name="CuadroTexto 7">
+            <a:extLst>
+              <a:ext uri="{FF2B5EF4-FFF2-40B4-BE49-F238E27FC236}">
+                <a16:creationId xmlns:a16="http://schemas.microsoft.com/office/drawing/2014/main" id="{152C8A77-647A-4001-81B8-157BAF9D71D0}"/>
+              </a:ext>
+            </a:extLst>
+          </p:cNvPr>
+          <p:cNvSpPr txBox="1"/>
+          <p:nvPr/>
+        </p:nvSpPr>
+        <p:spPr>
+          <a:xfrm>
+            <a:off x="5708495" y="4346741"/>
+            <a:ext cx="5834325" cy="1661993"/>
+          </a:xfrm>
+          <a:prstGeom prst="rect">
+            <a:avLst/>
+          </a:prstGeom>
+          <a:noFill/>
+        </p:spPr>
+        <p:txBody>
+          <a:bodyPr wrap="square" rtlCol="0">
+            <a:spAutoFit/>
+          </a:bodyPr>
+          <a:lstStyle/>
+          <a:p>
+            <a:r>
+              <a:rPr lang="es-ES" b="1" dirty="0"/>
+              <a:t>Modelos Avanzados</a:t>
+            </a:r>
+            <a:endParaRPr lang="en-US" b="1" dirty="0"/>
           </a:p>
           <a:p>
             <a:pPr marL="742950" lvl="1" indent="-285750">
@@ -9611,7 +10609,17 @@
             </a:pPr>
             <a:r>
               <a:rPr lang="en-US" sz="1400" dirty="0"/>
-              <a:t>Bayesian Structural Time Series Forecasting</a:t>
+              <a:t>Modelado de Series Temporales con Redes Neuronales</a:t>
+            </a:r>
+          </a:p>
+          <a:p>
+            <a:pPr marL="1200150" lvl="2" indent="-285750">
+              <a:buFont typeface="Wingdings" panose="05000000000000000000" pitchFamily="2" charset="2"/>
+              <a:buChar char="Ø"/>
+            </a:pPr>
+            <a:r>
+              <a:rPr lang="en-US" sz="1400" dirty="0"/>
+              <a:t>LSTM</a:t>
             </a:r>
           </a:p>
           <a:p>
@@ -9621,17 +10629,7 @@
             </a:pPr>
             <a:r>
               <a:rPr lang="en-US" sz="1400" dirty="0"/>
-              <a:t>Aplicabilidad de modelos</a:t>
-            </a:r>
-          </a:p>
-          <a:p>
-            <a:pPr marL="1200150" lvl="2" indent="-285750">
-              <a:buFont typeface="Wingdings" panose="05000000000000000000" pitchFamily="2" charset="2"/>
-              <a:buChar char="Ø"/>
-            </a:pPr>
-            <a:r>
-              <a:rPr lang="en-US" sz="1400" dirty="0"/>
-              <a:t>Teoría de los mercados eficientes</a:t>
+              <a:t>Bayesian Structural Time Series Forecasting</a:t>
             </a:r>
           </a:p>
           <a:p>
@@ -9640,9 +10638,10 @@
               <a:buChar char="Ø"/>
             </a:pPr>
             <a:r>
-              <a:rPr lang="en-US" sz="1400" dirty="0"/>
+              <a:rPr lang="en-US" sz="1400" dirty="0" err="1"/>
               <a:t>Simuladores</a:t>
             </a:r>
+            <a:endParaRPr lang="en-US" sz="1400" dirty="0"/>
           </a:p>
           <a:p>
             <a:pPr marL="1200150" lvl="2" indent="-285750">
@@ -11198,6 +12197,166 @@
   <p:clrMapOvr>
     <a:masterClrMapping/>
   </p:clrMapOvr>
+  <p:timing>
+    <p:tnLst>
+      <p:par>
+        <p:cTn id="1" dur="indefinite" restart="never" nodeType="tmRoot">
+          <p:childTnLst>
+            <p:seq concurrent="1" nextAc="seek">
+              <p:cTn id="2" dur="indefinite" nodeType="mainSeq">
+                <p:childTnLst>
+                  <p:par>
+                    <p:cTn id="3" fill="hold">
+                      <p:stCondLst>
+                        <p:cond delay="indefinite"/>
+                      </p:stCondLst>
+                      <p:childTnLst>
+                        <p:par>
+                          <p:cTn id="4" fill="hold">
+                            <p:stCondLst>
+                              <p:cond delay="0"/>
+                            </p:stCondLst>
+                            <p:childTnLst>
+                              <p:par>
+                                <p:cTn id="5" presetID="1" presetClass="entr" presetSubtype="0" fill="hold" nodeType="clickEffect">
+                                  <p:stCondLst>
+                                    <p:cond delay="0"/>
+                                  </p:stCondLst>
+                                  <p:childTnLst>
+                                    <p:set>
+                                      <p:cBhvr>
+                                        <p:cTn id="6" dur="1" fill="hold">
+                                          <p:stCondLst>
+                                            <p:cond delay="0"/>
+                                          </p:stCondLst>
+                                        </p:cTn>
+                                        <p:tgtEl>
+                                          <p:spTgt spid="2054"/>
+                                        </p:tgtEl>
+                                        <p:attrNameLst>
+                                          <p:attrName>style.visibility</p:attrName>
+                                        </p:attrNameLst>
+                                      </p:cBhvr>
+                                      <p:to>
+                                        <p:strVal val="visible"/>
+                                      </p:to>
+                                    </p:set>
+                                  </p:childTnLst>
+                                </p:cTn>
+                              </p:par>
+                              <p:par>
+                                <p:cTn id="7" presetID="1" presetClass="entr" presetSubtype="0" fill="hold" grpId="0" nodeType="withEffect">
+                                  <p:stCondLst>
+                                    <p:cond delay="0"/>
+                                  </p:stCondLst>
+                                  <p:childTnLst>
+                                    <p:set>
+                                      <p:cBhvr>
+                                        <p:cTn id="8" dur="1" fill="hold">
+                                          <p:stCondLst>
+                                            <p:cond delay="0"/>
+                                          </p:stCondLst>
+                                        </p:cTn>
+                                        <p:tgtEl>
+                                          <p:spTgt spid="17"/>
+                                        </p:tgtEl>
+                                        <p:attrNameLst>
+                                          <p:attrName>style.visibility</p:attrName>
+                                        </p:attrNameLst>
+                                      </p:cBhvr>
+                                      <p:to>
+                                        <p:strVal val="visible"/>
+                                      </p:to>
+                                    </p:set>
+                                  </p:childTnLst>
+                                </p:cTn>
+                              </p:par>
+                              <p:par>
+                                <p:cTn id="9" presetID="1" presetClass="entr" presetSubtype="0" fill="hold" grpId="0" nodeType="withEffect">
+                                  <p:stCondLst>
+                                    <p:cond delay="0"/>
+                                  </p:stCondLst>
+                                  <p:childTnLst>
+                                    <p:set>
+                                      <p:cBhvr>
+                                        <p:cTn id="10" dur="1" fill="hold">
+                                          <p:stCondLst>
+                                            <p:cond delay="0"/>
+                                          </p:stCondLst>
+                                        </p:cTn>
+                                        <p:tgtEl>
+                                          <p:spTgt spid="5"/>
+                                        </p:tgtEl>
+                                        <p:attrNameLst>
+                                          <p:attrName>style.visibility</p:attrName>
+                                        </p:attrNameLst>
+                                      </p:cBhvr>
+                                      <p:to>
+                                        <p:strVal val="visible"/>
+                                      </p:to>
+                                    </p:set>
+                                  </p:childTnLst>
+                                </p:cTn>
+                              </p:par>
+                              <p:par>
+                                <p:cTn id="11" presetID="1" presetClass="entr" presetSubtype="0" fill="hold" nodeType="withEffect">
+                                  <p:stCondLst>
+                                    <p:cond delay="0"/>
+                                  </p:stCondLst>
+                                  <p:childTnLst>
+                                    <p:set>
+                                      <p:cBhvr>
+                                        <p:cTn id="12" dur="1" fill="hold">
+                                          <p:stCondLst>
+                                            <p:cond delay="0"/>
+                                          </p:stCondLst>
+                                        </p:cTn>
+                                        <p:tgtEl>
+                                          <p:spTgt spid="2052"/>
+                                        </p:tgtEl>
+                                        <p:attrNameLst>
+                                          <p:attrName>style.visibility</p:attrName>
+                                        </p:attrNameLst>
+                                      </p:cBhvr>
+                                      <p:to>
+                                        <p:strVal val="visible"/>
+                                      </p:to>
+                                    </p:set>
+                                  </p:childTnLst>
+                                </p:cTn>
+                              </p:par>
+                            </p:childTnLst>
+                          </p:cTn>
+                        </p:par>
+                      </p:childTnLst>
+                    </p:cTn>
+                  </p:par>
+                </p:childTnLst>
+              </p:cTn>
+              <p:prevCondLst>
+                <p:cond evt="onPrev" delay="0">
+                  <p:tgtEl>
+                    <p:sldTgt/>
+                  </p:tgtEl>
+                </p:cond>
+              </p:prevCondLst>
+              <p:nextCondLst>
+                <p:cond evt="onNext" delay="0">
+                  <p:tgtEl>
+                    <p:sldTgt/>
+                  </p:tgtEl>
+                </p:cond>
+              </p:nextCondLst>
+            </p:seq>
+          </p:childTnLst>
+        </p:cTn>
+      </p:par>
+    </p:tnLst>
+    <p:bldLst>
+      <p:bldP spid="5" grpId="0" animBg="1"/>
+      <p:bldP spid="17" grpId="0" animBg="1"/>
+    </p:bldLst>
+  </p:timing>
 </p:sld>
 </file>
 

</xml_diff>

<commit_message>
Se actualiza el código para incluir la estacionalidad en el ARIMA de pruebas
</commit_message>
<xml_diff>
--- a/01_INTRODUCTION/01_INTRODUCCION_TSLAB.pptx
+++ b/01_INTRODUCTION/01_INTRODUCCION_TSLAB.pptx
@@ -7679,6 +7679,36 @@
           <a:chExt cx="0" cy="0"/>
         </a:xfrm>
       </p:grpSpPr>
+      <p:pic>
+        <p:nvPicPr>
+          <p:cNvPr id="6" name="Imagen 5">
+            <a:extLst>
+              <a:ext uri="{FF2B5EF4-FFF2-40B4-BE49-F238E27FC236}">
+                <a16:creationId xmlns:a16="http://schemas.microsoft.com/office/drawing/2014/main" id="{BE2FABF5-C672-45B5-B20B-0C5B6E8145CB}"/>
+              </a:ext>
+            </a:extLst>
+          </p:cNvPr>
+          <p:cNvPicPr>
+            <a:picLocks noChangeAspect="1"/>
+          </p:cNvPicPr>
+          <p:nvPr/>
+        </p:nvPicPr>
+        <p:blipFill>
+          <a:blip r:embed="rId2"/>
+          <a:stretch>
+            <a:fillRect/>
+          </a:stretch>
+        </p:blipFill>
+        <p:spPr>
+          <a:xfrm>
+            <a:off x="87520" y="2892960"/>
+            <a:ext cx="6973711" cy="3895895"/>
+          </a:xfrm>
+          <a:prstGeom prst="rect">
+            <a:avLst/>
+          </a:prstGeom>
+        </p:spPr>
+      </p:pic>
       <p:sp>
         <p:nvSpPr>
           <p:cNvPr id="11" name="Flecha: doblada 10">
@@ -7693,7 +7723,7 @@
         </p:nvSpPr>
         <p:spPr>
           <a:xfrm rot="19365064" flipV="1">
-            <a:off x="6510811" y="5847242"/>
+            <a:off x="7229060" y="5847242"/>
             <a:ext cx="720395" cy="797334"/>
           </a:xfrm>
           <a:prstGeom prst="bentArrow">
@@ -7756,7 +7786,7 @@
         </p:nvSpPr>
         <p:spPr>
           <a:xfrm>
-            <a:off x="6212079" y="6185183"/>
+            <a:off x="7061229" y="6093844"/>
             <a:ext cx="442937" cy="450055"/>
           </a:xfrm>
           <a:prstGeom prst="rect">
@@ -7920,7 +7950,7 @@
         </p:nvSpPr>
         <p:spPr>
           <a:xfrm>
-            <a:off x="8194578" y="2792080"/>
+            <a:off x="8311191" y="2643239"/>
             <a:ext cx="3793289" cy="1754326"/>
           </a:xfrm>
           <a:prstGeom prst="rect">
@@ -7956,36 +7986,6 @@
           </a:p>
         </p:txBody>
       </p:sp>
-      <p:pic>
-        <p:nvPicPr>
-          <p:cNvPr id="9" name="Imagen 8">
-            <a:extLst>
-              <a:ext uri="{FF2B5EF4-FFF2-40B4-BE49-F238E27FC236}">
-                <a16:creationId xmlns:a16="http://schemas.microsoft.com/office/drawing/2014/main" id="{594975B5-1F6F-4630-A657-35933BC94BB4}"/>
-              </a:ext>
-            </a:extLst>
-          </p:cNvPr>
-          <p:cNvPicPr>
-            <a:picLocks noChangeAspect="1"/>
-          </p:cNvPicPr>
-          <p:nvPr/>
-        </p:nvPicPr>
-        <p:blipFill>
-          <a:blip r:embed="rId2"/>
-          <a:stretch>
-            <a:fillRect/>
-          </a:stretch>
-        </p:blipFill>
-        <p:spPr>
-          <a:xfrm>
-            <a:off x="22518" y="2697005"/>
-            <a:ext cx="6262779" cy="4160995"/>
-          </a:xfrm>
-          <a:prstGeom prst="rect">
-            <a:avLst/>
-          </a:prstGeom>
-        </p:spPr>
-      </p:pic>
       <p:sp>
         <p:nvSpPr>
           <p:cNvPr id="12" name="CuadroTexto 11">
@@ -8000,7 +8000,7 @@
         </p:nvSpPr>
         <p:spPr>
           <a:xfrm>
-            <a:off x="5884890" y="4177074"/>
+            <a:off x="6603139" y="4177074"/>
             <a:ext cx="1582782" cy="369332"/>
           </a:xfrm>
           <a:prstGeom prst="rect">
@@ -8042,7 +8042,7 @@
         </p:nvSpPr>
         <p:spPr>
           <a:xfrm>
-            <a:off x="5884890" y="4996462"/>
+            <a:off x="6603139" y="4996462"/>
             <a:ext cx="1972239" cy="369332"/>
           </a:xfrm>
           <a:prstGeom prst="rect">
@@ -8084,7 +8084,7 @@
         </p:nvSpPr>
         <p:spPr>
           <a:xfrm>
-            <a:off x="5884890" y="5815850"/>
+            <a:off x="6603139" y="5815850"/>
             <a:ext cx="938969" cy="369332"/>
           </a:xfrm>
           <a:prstGeom prst="rect">
@@ -8126,7 +8126,7 @@
         </p:nvSpPr>
         <p:spPr>
           <a:xfrm>
-            <a:off x="7298603" y="5639250"/>
+            <a:off x="8016852" y="5639250"/>
             <a:ext cx="1747659" cy="646331"/>
           </a:xfrm>
           <a:prstGeom prst="rect">

</xml_diff>